<commit_message>
Add formal UML diagrams (PlantUML) and update PPTX
- Created 5 PlantUML diagrams (architecture, sequence, K8s, component, class)
- Generated PNG images from PlantUML using online service
- Updated PPTX with formal UML diagrams (now 5 slides)
- Added conversion scripts for PlantUML to PNG
- PPTX size: 398KB (includes all UML diagrams)
</commit_message>
<xml_diff>
--- a/microROS_WASM_K8s_Feasibility.pptx
+++ b/microROS_WASM_K8s_Feasibility.pptx
@@ -9,6 +9,7 @@
     <p:sldId id="257" r:id="rId8"/>
     <p:sldId id="258" r:id="rId9"/>
     <p:sldId id="259" r:id="rId10"/>
+    <p:sldId id="260" r:id="rId11"/>
   </p:sldIdLst>
   <p:sldSz cx="9144000" cy="6858000" type="screen4x3"/>
   <p:notesSz cx="6858000" cy="9144000"/>
@@ -3891,6 +3892,54 @@
           </a:prstGeom>
         </p:spPr>
       </p:pic>
+      <p:pic>
+        <p:nvPicPr>
+          <p:cNvPr id="38" name="Picture 37" descr="architecture.png"/>
+          <p:cNvPicPr>
+            <a:picLocks noChangeAspect="1"/>
+          </p:cNvPicPr>
+          <p:nvPr/>
+        </p:nvPicPr>
+        <p:blipFill>
+          <a:blip r:embed="rId4"/>
+          <a:stretch>
+            <a:fillRect/>
+          </a:stretch>
+        </p:blipFill>
+        <p:spPr>
+          <a:xfrm>
+            <a:off x="457200" y="1645920"/>
+            <a:ext cx="4114800" cy="2926080"/>
+          </a:xfrm>
+          <a:prstGeom prst="rect">
+            <a:avLst/>
+          </a:prstGeom>
+        </p:spPr>
+      </p:pic>
+      <p:pic>
+        <p:nvPicPr>
+          <p:cNvPr id="39" name="Picture 38" descr="sequence.png"/>
+          <p:cNvPicPr>
+            <a:picLocks noChangeAspect="1"/>
+          </p:cNvPicPr>
+          <p:nvPr/>
+        </p:nvPicPr>
+        <p:blipFill>
+          <a:blip r:embed="rId5"/>
+          <a:stretch>
+            <a:fillRect/>
+          </a:stretch>
+        </p:blipFill>
+        <p:spPr>
+          <a:xfrm>
+            <a:off x="5029200" y="1645920"/>
+            <a:ext cx="4114800" cy="2926080"/>
+          </a:xfrm>
+          <a:prstGeom prst="rect">
+            <a:avLst/>
+          </a:prstGeom>
+        </p:spPr>
+      </p:pic>
     </p:spTree>
   </p:cSld>
   <p:clrMapOvr>
@@ -4239,9 +4288,121 @@
           </a:p>
         </p:txBody>
       </p:sp>
+      <p:sp>
+        <p:nvSpPr>
+          <p:cNvPr id="3" name="TextBox 2"/>
+          <p:cNvSpPr txBox="1"/>
+          <p:nvPr/>
+        </p:nvSpPr>
+        <p:spPr>
+          <a:xfrm>
+            <a:off x="457200" y="457200"/>
+            <a:ext cx="8229600" cy="914400"/>
+          </a:xfrm>
+          <a:prstGeom prst="rect">
+            <a:avLst/>
+          </a:prstGeom>
+          <a:noFill/>
+        </p:spPr>
+        <p:txBody>
+          <a:bodyPr wrap="none">
+            <a:spAutoFit/>
+          </a:bodyPr>
+          <a:lstStyle/>
+          <a:p>
+            <a:pPr>
+              <a:defRPr sz="3600" b="1">
+                <a:solidFill>
+                  <a:srgbClr val="003366"/>
+                </a:solidFill>
+              </a:defRPr>
+            </a:pPr>
+            <a:r>
+              <a:t>Kubernetes Deployment Architecture</a:t>
+            </a:r>
+          </a:p>
+        </p:txBody>
+      </p:sp>
       <p:pic>
         <p:nvPicPr>
-          <p:cNvPr id="3" name="Picture 2" descr="k8s_deployment_diagram.png"/>
+          <p:cNvPr id="4" name="Picture 3" descr="k8s_deployment.png"/>
+          <p:cNvPicPr>
+            <a:picLocks noChangeAspect="1"/>
+          </p:cNvPicPr>
+          <p:nvPr/>
+        </p:nvPicPr>
+        <p:blipFill>
+          <a:blip r:embed="rId3"/>
+          <a:stretch>
+            <a:fillRect/>
+          </a:stretch>
+        </p:blipFill>
+        <p:spPr>
+          <a:xfrm>
+            <a:off x="457200" y="1645920"/>
+            <a:ext cx="8229600" cy="5029200"/>
+          </a:xfrm>
+          <a:prstGeom prst="rect">
+            <a:avLst/>
+          </a:prstGeom>
+        </p:spPr>
+      </p:pic>
+    </p:spTree>
+  </p:cSld>
+  <p:clrMapOvr>
+    <a:masterClrMapping/>
+  </p:clrMapOvr>
+</p:sld>
+</file>
+
+<file path=ppt/slides/slide5.xml><?xml version="1.0" encoding="utf-8"?>
+<p:sld xmlns:a="http://schemas.openxmlformats.org/drawingml/2006/main" xmlns:p="http://schemas.openxmlformats.org/presentationml/2006/main" xmlns:r="http://schemas.openxmlformats.org/officeDocument/2006/relationships">
+  <p:cSld>
+    <p:spTree>
+      <p:nvGrpSpPr>
+        <p:cNvPr id="1" name=""/>
+        <p:cNvGrpSpPr/>
+        <p:nvPr/>
+      </p:nvGrpSpPr>
+      <p:grpSpPr/>
+      <p:sp>
+        <p:nvSpPr>
+          <p:cNvPr id="2" name="TextBox 1"/>
+          <p:cNvSpPr txBox="1"/>
+          <p:nvPr/>
+        </p:nvSpPr>
+        <p:spPr>
+          <a:xfrm>
+            <a:off x="457200" y="457200"/>
+            <a:ext cx="8229600" cy="914400"/>
+          </a:xfrm>
+          <a:prstGeom prst="rect">
+            <a:avLst/>
+          </a:prstGeom>
+          <a:noFill/>
+        </p:spPr>
+        <p:txBody>
+          <a:bodyPr wrap="none">
+            <a:spAutoFit/>
+          </a:bodyPr>
+          <a:lstStyle/>
+          <a:p>
+            <a:pPr>
+              <a:defRPr sz="3600" b="1">
+                <a:solidFill>
+                  <a:srgbClr val="003366"/>
+                </a:solidFill>
+              </a:defRPr>
+            </a:pPr>
+            <a:r>
+              <a:t>System Component &amp; Class Diagrams</a:t>
+            </a:r>
+          </a:p>
+        </p:txBody>
+      </p:sp>
+      <p:pic>
+        <p:nvPicPr>
+          <p:cNvPr id="3" name="Picture 2" descr="component_diagram.png"/>
           <p:cNvPicPr>
             <a:picLocks noChangeAspect="1"/>
           </p:cNvPicPr>
@@ -4256,7 +4417,31 @@
         <p:spPr>
           <a:xfrm>
             <a:off x="457200" y="1645920"/>
-            <a:ext cx="8229600" cy="5029200"/>
+            <a:ext cx="4114800" cy="2926080"/>
+          </a:xfrm>
+          <a:prstGeom prst="rect">
+            <a:avLst/>
+          </a:prstGeom>
+        </p:spPr>
+      </p:pic>
+      <p:pic>
+        <p:nvPicPr>
+          <p:cNvPr id="4" name="Picture 3" descr="class_diagram.png"/>
+          <p:cNvPicPr>
+            <a:picLocks noChangeAspect="1"/>
+          </p:cNvPicPr>
+          <p:nvPr/>
+        </p:nvPicPr>
+        <p:blipFill>
+          <a:blip r:embed="rId3"/>
+          <a:stretch>
+            <a:fillRect/>
+          </a:stretch>
+        </p:blipFill>
+        <p:spPr>
+          <a:xfrm>
+            <a:off x="5029200" y="1645920"/>
+            <a:ext cx="4114800" cy="2926080"/>
           </a:xfrm>
           <a:prstGeom prst="rect">
             <a:avLst/>

</xml_diff>

<commit_message>
Final update: All UML diagrams show ROS executing INSIDE WASM
- Recreated all PlantUML files with explicit 'executing in WASM' labels
- All diagrams now clearly show: ROS code compiled to WASM bytecode
- Executed by WASM runtime, no external ROS process
- Direct WASM-to-WASM communication via ROS2 DDS
- Updated architecture, architecture_complete, component diagrams
- All PNG regenerated with updated diagrams
</commit_message>
<xml_diff>
--- a/microROS_WASM_K8s_Feasibility.pptx
+++ b/microROS_WASM_K8s_Feasibility.pptx
@@ -10,6 +10,12 @@
     <p:sldId id="258" r:id="rId9"/>
     <p:sldId id="259" r:id="rId10"/>
     <p:sldId id="260" r:id="rId11"/>
+    <p:sldId id="261" r:id="rId12"/>
+    <p:sldId id="262" r:id="rId13"/>
+    <p:sldId id="263" r:id="rId14"/>
+    <p:sldId id="264" r:id="rId15"/>
+    <p:sldId id="265" r:id="rId16"/>
+    <p:sldId id="266" r:id="rId17"/>
   </p:sldIdLst>
   <p:sldSz cx="9144000" cy="6858000" type="screen4x3"/>
   <p:notesSz cx="6858000" cy="9144000"/>
@@ -3344,6 +3350,112 @@
 </p:sld>
 </file>
 
+<file path=ppt/slides/slide10.xml><?xml version="1.0" encoding="utf-8"?>
+<p:sld xmlns:a="http://schemas.openxmlformats.org/drawingml/2006/main" xmlns:p="http://schemas.openxmlformats.org/presentationml/2006/main" xmlns:r="http://schemas.openxmlformats.org/officeDocument/2006/relationships">
+  <p:cSld>
+    <p:spTree>
+      <p:nvGrpSpPr>
+        <p:cNvPr id="1" name=""/>
+        <p:cNvGrpSpPr/>
+        <p:nvPr/>
+      </p:nvGrpSpPr>
+      <p:grpSpPr/>
+      <p:sp>
+        <p:nvSpPr>
+          <p:cNvPr id="2" name="TextBox 1"/>
+          <p:cNvSpPr txBox="1"/>
+          <p:nvPr/>
+        </p:nvSpPr>
+        <p:spPr>
+          <a:xfrm>
+            <a:off x="457200" y="457200"/>
+            <a:ext cx="8229600" cy="914400"/>
+          </a:xfrm>
+          <a:prstGeom prst="rect">
+            <a:avLst/>
+          </a:prstGeom>
+          <a:noFill/>
+        </p:spPr>
+        <p:txBody>
+          <a:bodyPr wrap="none">
+            <a:spAutoFit/>
+          </a:bodyPr>
+          <a:lstStyle/>
+          <a:p>
+            <a:pPr>
+              <a:defRPr sz="3600" b="1">
+                <a:solidFill>
+                  <a:srgbClr val="003366"/>
+                </a:solidFill>
+              </a:defRPr>
+            </a:pPr>
+            <a:r>
+              <a:t>System Component &amp; Class Diagrams</a:t>
+            </a:r>
+          </a:p>
+        </p:txBody>
+      </p:sp>
+    </p:spTree>
+  </p:cSld>
+  <p:clrMapOvr>
+    <a:masterClrMapping/>
+  </p:clrMapOvr>
+</p:sld>
+</file>
+
+<file path=ppt/slides/slide11.xml><?xml version="1.0" encoding="utf-8"?>
+<p:sld xmlns:a="http://schemas.openxmlformats.org/drawingml/2006/main" xmlns:p="http://schemas.openxmlformats.org/presentationml/2006/main" xmlns:r="http://schemas.openxmlformats.org/officeDocument/2006/relationships">
+  <p:cSld>
+    <p:spTree>
+      <p:nvGrpSpPr>
+        <p:cNvPr id="1" name=""/>
+        <p:cNvGrpSpPr/>
+        <p:nvPr/>
+      </p:nvGrpSpPr>
+      <p:grpSpPr/>
+      <p:sp>
+        <p:nvSpPr>
+          <p:cNvPr id="2" name="TextBox 1"/>
+          <p:cNvSpPr txBox="1"/>
+          <p:nvPr/>
+        </p:nvSpPr>
+        <p:spPr>
+          <a:xfrm>
+            <a:off x="457200" y="457200"/>
+            <a:ext cx="8229600" cy="914400"/>
+          </a:xfrm>
+          <a:prstGeom prst="rect">
+            <a:avLst/>
+          </a:prstGeom>
+          <a:noFill/>
+        </p:spPr>
+        <p:txBody>
+          <a:bodyPr wrap="none">
+            <a:spAutoFit/>
+          </a:bodyPr>
+          <a:lstStyle/>
+          <a:p>
+            <a:pPr>
+              <a:defRPr sz="3600" b="1">
+                <a:solidFill>
+                  <a:srgbClr val="003366"/>
+                </a:solidFill>
+              </a:defRPr>
+            </a:pPr>
+            <a:r>
+              <a:t>System Component &amp; Class Diagrams</a:t>
+            </a:r>
+          </a:p>
+        </p:txBody>
+      </p:sp>
+    </p:spTree>
+  </p:cSld>
+  <p:clrMapOvr>
+    <a:masterClrMapping/>
+  </p:clrMapOvr>
+</p:sld>
+</file>
+
 <file path=ppt/slides/slide2.xml><?xml version="1.0" encoding="utf-8"?>
 <p:sld xmlns:a="http://schemas.openxmlformats.org/drawingml/2006/main" xmlns:p="http://schemas.openxmlformats.org/presentationml/2006/main" xmlns:r="http://schemas.openxmlformats.org/officeDocument/2006/relationships">
   <p:cSld>
@@ -3940,6 +4052,54 @@
           </a:prstGeom>
         </p:spPr>
       </p:pic>
+      <p:pic>
+        <p:nvPicPr>
+          <p:cNvPr id="40" name="Picture 39" descr="architecture.png"/>
+          <p:cNvPicPr>
+            <a:picLocks noChangeAspect="1"/>
+          </p:cNvPicPr>
+          <p:nvPr/>
+        </p:nvPicPr>
+        <p:blipFill>
+          <a:blip r:embed="rId6"/>
+          <a:stretch>
+            <a:fillRect/>
+          </a:stretch>
+        </p:blipFill>
+        <p:spPr>
+          <a:xfrm>
+            <a:off x="457200" y="1645920"/>
+            <a:ext cx="4114800" cy="2926080"/>
+          </a:xfrm>
+          <a:prstGeom prst="rect">
+            <a:avLst/>
+          </a:prstGeom>
+        </p:spPr>
+      </p:pic>
+      <p:pic>
+        <p:nvPicPr>
+          <p:cNvPr id="41" name="Picture 40" descr="sequence.png"/>
+          <p:cNvPicPr>
+            <a:picLocks noChangeAspect="1"/>
+          </p:cNvPicPr>
+          <p:nvPr/>
+        </p:nvPicPr>
+        <p:blipFill>
+          <a:blip r:embed="rId7"/>
+          <a:stretch>
+            <a:fillRect/>
+          </a:stretch>
+        </p:blipFill>
+        <p:spPr>
+          <a:xfrm>
+            <a:off x="5029200" y="1645920"/>
+            <a:ext cx="4114800" cy="2926080"/>
+          </a:xfrm>
+          <a:prstGeom prst="rect">
+            <a:avLst/>
+          </a:prstGeom>
+        </p:spPr>
+      </p:pic>
     </p:spTree>
   </p:cSld>
   <p:clrMapOvr>
@@ -4323,16 +4483,156 @@
           </a:p>
         </p:txBody>
       </p:sp>
+      <p:sp>
+        <p:nvSpPr>
+          <p:cNvPr id="4" name="TextBox 3"/>
+          <p:cNvSpPr txBox="1"/>
+          <p:nvPr/>
+        </p:nvSpPr>
+        <p:spPr>
+          <a:xfrm>
+            <a:off x="457200" y="457200"/>
+            <a:ext cx="8229600" cy="914400"/>
+          </a:xfrm>
+          <a:prstGeom prst="rect">
+            <a:avLst/>
+          </a:prstGeom>
+          <a:noFill/>
+        </p:spPr>
+        <p:txBody>
+          <a:bodyPr wrap="none">
+            <a:spAutoFit/>
+          </a:bodyPr>
+          <a:lstStyle/>
+          <a:p>
+            <a:pPr>
+              <a:defRPr sz="3600" b="1">
+                <a:solidFill>
+                  <a:srgbClr val="003366"/>
+                </a:solidFill>
+              </a:defRPr>
+            </a:pPr>
+            <a:r>
+              <a:t>Kubernetes Deployment Architecture</a:t>
+            </a:r>
+          </a:p>
+        </p:txBody>
+      </p:sp>
+      <p:sp>
+        <p:nvSpPr>
+          <p:cNvPr id="5" name="TextBox 4"/>
+          <p:cNvSpPr txBox="1"/>
+          <p:nvPr/>
+        </p:nvSpPr>
+        <p:spPr>
+          <a:xfrm>
+            <a:off x="457200" y="457200"/>
+            <a:ext cx="8229600" cy="914400"/>
+          </a:xfrm>
+          <a:prstGeom prst="rect">
+            <a:avLst/>
+          </a:prstGeom>
+          <a:noFill/>
+        </p:spPr>
+        <p:txBody>
+          <a:bodyPr wrap="none">
+            <a:spAutoFit/>
+          </a:bodyPr>
+          <a:lstStyle/>
+          <a:p>
+            <a:pPr>
+              <a:defRPr sz="3600" b="1">
+                <a:solidFill>
+                  <a:srgbClr val="003366"/>
+                </a:solidFill>
+              </a:defRPr>
+            </a:pPr>
+            <a:r>
+              <a:t>Kubernetes Deployment Architecture</a:t>
+            </a:r>
+          </a:p>
+        </p:txBody>
+      </p:sp>
+      <p:sp>
+        <p:nvSpPr>
+          <p:cNvPr id="6" name="TextBox 5"/>
+          <p:cNvSpPr txBox="1"/>
+          <p:nvPr/>
+        </p:nvSpPr>
+        <p:spPr>
+          <a:xfrm>
+            <a:off x="457200" y="457200"/>
+            <a:ext cx="8229600" cy="914400"/>
+          </a:xfrm>
+          <a:prstGeom prst="rect">
+            <a:avLst/>
+          </a:prstGeom>
+          <a:noFill/>
+        </p:spPr>
+        <p:txBody>
+          <a:bodyPr wrap="none">
+            <a:spAutoFit/>
+          </a:bodyPr>
+          <a:lstStyle/>
+          <a:p>
+            <a:pPr>
+              <a:defRPr sz="3600" b="1">
+                <a:solidFill>
+                  <a:srgbClr val="003366"/>
+                </a:solidFill>
+              </a:defRPr>
+            </a:pPr>
+            <a:r>
+              <a:t>Kubernetes Deployment Architecture</a:t>
+            </a:r>
+          </a:p>
+        </p:txBody>
+      </p:sp>
+      <p:sp>
+        <p:nvSpPr>
+          <p:cNvPr id="7" name="TextBox 6"/>
+          <p:cNvSpPr txBox="1"/>
+          <p:nvPr/>
+        </p:nvSpPr>
+        <p:spPr>
+          <a:xfrm>
+            <a:off x="457200" y="457200"/>
+            <a:ext cx="8229600" cy="914400"/>
+          </a:xfrm>
+          <a:prstGeom prst="rect">
+            <a:avLst/>
+          </a:prstGeom>
+          <a:noFill/>
+        </p:spPr>
+        <p:txBody>
+          <a:bodyPr wrap="none">
+            <a:spAutoFit/>
+          </a:bodyPr>
+          <a:lstStyle/>
+          <a:p>
+            <a:pPr>
+              <a:defRPr sz="3600" b="1">
+                <a:solidFill>
+                  <a:srgbClr val="003366"/>
+                </a:solidFill>
+              </a:defRPr>
+            </a:pPr>
+            <a:r>
+              <a:t>Kubernetes Deployment Architecture</a:t>
+            </a:r>
+          </a:p>
+        </p:txBody>
+      </p:sp>
       <p:pic>
         <p:nvPicPr>
-          <p:cNvPr id="4" name="Picture 3" descr="k8s_deployment.png"/>
+          <p:cNvPr id="8" name="Picture 7" descr="image.png"/>
           <p:cNvPicPr>
             <a:picLocks noChangeAspect="1"/>
           </p:cNvPicPr>
           <p:nvPr/>
         </p:nvPicPr>
         <p:blipFill>
-          <a:blip r:embed="rId3"/>
+          <a:blip r:embed="rId5"/>
           <a:stretch>
             <a:fillRect/>
           </a:stretch>
@@ -4448,6 +4748,384 @@
           </a:prstGeom>
         </p:spPr>
       </p:pic>
+    </p:spTree>
+  </p:cSld>
+  <p:clrMapOvr>
+    <a:masterClrMapping/>
+  </p:clrMapOvr>
+</p:sld>
+</file>
+
+<file path=ppt/slides/slide6.xml><?xml version="1.0" encoding="utf-8"?>
+<p:sld xmlns:a="http://schemas.openxmlformats.org/drawingml/2006/main" xmlns:p="http://schemas.openxmlformats.org/presentationml/2006/main" xmlns:r="http://schemas.openxmlformats.org/officeDocument/2006/relationships">
+  <p:cSld>
+    <p:spTree>
+      <p:nvGrpSpPr>
+        <p:cNvPr id="1" name=""/>
+        <p:cNvGrpSpPr/>
+        <p:nvPr/>
+      </p:nvGrpSpPr>
+      <p:grpSpPr/>
+      <p:sp>
+        <p:nvSpPr>
+          <p:cNvPr id="2" name="TextBox 1"/>
+          <p:cNvSpPr txBox="1"/>
+          <p:nvPr/>
+        </p:nvSpPr>
+        <p:spPr>
+          <a:xfrm>
+            <a:off x="457200" y="457200"/>
+            <a:ext cx="8229600" cy="914400"/>
+          </a:xfrm>
+          <a:prstGeom prst="rect">
+            <a:avLst/>
+          </a:prstGeom>
+          <a:noFill/>
+        </p:spPr>
+        <p:txBody>
+          <a:bodyPr wrap="none">
+            <a:spAutoFit/>
+          </a:bodyPr>
+          <a:lstStyle/>
+          <a:p>
+            <a:pPr>
+              <a:defRPr sz="3600" b="1">
+                <a:solidFill>
+                  <a:srgbClr val="003366"/>
+                </a:solidFill>
+              </a:defRPr>
+            </a:pPr>
+            <a:r>
+              <a:t>System Component &amp; Class Diagrams</a:t>
+            </a:r>
+          </a:p>
+        </p:txBody>
+      </p:sp>
+      <p:pic>
+        <p:nvPicPr>
+          <p:cNvPr id="3" name="Picture 2" descr="component_diagram.png"/>
+          <p:cNvPicPr>
+            <a:picLocks noChangeAspect="1"/>
+          </p:cNvPicPr>
+          <p:nvPr/>
+        </p:nvPicPr>
+        <p:blipFill>
+          <a:blip r:embed="rId2"/>
+          <a:stretch>
+            <a:fillRect/>
+          </a:stretch>
+        </p:blipFill>
+        <p:spPr>
+          <a:xfrm>
+            <a:off x="457200" y="1645920"/>
+            <a:ext cx="4114800" cy="2926080"/>
+          </a:xfrm>
+          <a:prstGeom prst="rect">
+            <a:avLst/>
+          </a:prstGeom>
+        </p:spPr>
+      </p:pic>
+      <p:pic>
+        <p:nvPicPr>
+          <p:cNvPr id="4" name="Picture 3" descr="class_diagram.png"/>
+          <p:cNvPicPr>
+            <a:picLocks noChangeAspect="1"/>
+          </p:cNvPicPr>
+          <p:nvPr/>
+        </p:nvPicPr>
+        <p:blipFill>
+          <a:blip r:embed="rId3"/>
+          <a:stretch>
+            <a:fillRect/>
+          </a:stretch>
+        </p:blipFill>
+        <p:spPr>
+          <a:xfrm>
+            <a:off x="5029200" y="1645920"/>
+            <a:ext cx="4114800" cy="2926080"/>
+          </a:xfrm>
+          <a:prstGeom prst="rect">
+            <a:avLst/>
+          </a:prstGeom>
+        </p:spPr>
+      </p:pic>
+    </p:spTree>
+  </p:cSld>
+  <p:clrMapOvr>
+    <a:masterClrMapping/>
+  </p:clrMapOvr>
+</p:sld>
+</file>
+
+<file path=ppt/slides/slide7.xml><?xml version="1.0" encoding="utf-8"?>
+<p:sld xmlns:a="http://schemas.openxmlformats.org/drawingml/2006/main" xmlns:p="http://schemas.openxmlformats.org/presentationml/2006/main" xmlns:r="http://schemas.openxmlformats.org/officeDocument/2006/relationships">
+  <p:cSld>
+    <p:spTree>
+      <p:nvGrpSpPr>
+        <p:cNvPr id="1" name=""/>
+        <p:cNvGrpSpPr/>
+        <p:nvPr/>
+      </p:nvGrpSpPr>
+      <p:grpSpPr/>
+      <p:sp>
+        <p:nvSpPr>
+          <p:cNvPr id="2" name="TextBox 1"/>
+          <p:cNvSpPr txBox="1"/>
+          <p:nvPr/>
+        </p:nvSpPr>
+        <p:spPr>
+          <a:xfrm>
+            <a:off x="457200" y="274320"/>
+            <a:ext cx="8229600" cy="731520"/>
+          </a:xfrm>
+          <a:prstGeom prst="rect">
+            <a:avLst/>
+          </a:prstGeom>
+          <a:noFill/>
+        </p:spPr>
+        <p:txBody>
+          <a:bodyPr wrap="none">
+            <a:spAutoFit/>
+          </a:bodyPr>
+          <a:lstStyle/>
+          <a:p>
+            <a:pPr algn="ctr">
+              <a:defRPr sz="4000" b="1">
+                <a:solidFill>
+                  <a:srgbClr val="003366"/>
+                </a:solidFill>
+              </a:defRPr>
+            </a:pPr>
+            <a:r>
+              <a:t>Complete System Architecture</a:t>
+            </a:r>
+          </a:p>
+        </p:txBody>
+      </p:sp>
+      <p:sp>
+        <p:nvSpPr>
+          <p:cNvPr id="3" name="TextBox 2"/>
+          <p:cNvSpPr txBox="1"/>
+          <p:nvPr/>
+        </p:nvSpPr>
+        <p:spPr>
+          <a:xfrm>
+            <a:off x="457200" y="914400"/>
+            <a:ext cx="8229600" cy="457200"/>
+          </a:xfrm>
+          <a:prstGeom prst="rect">
+            <a:avLst/>
+          </a:prstGeom>
+          <a:noFill/>
+        </p:spPr>
+        <p:txBody>
+          <a:bodyPr wrap="none">
+            <a:spAutoFit/>
+          </a:bodyPr>
+          <a:lstStyle/>
+          <a:p>
+            <a:pPr algn="ctr">
+              <a:defRPr sz="2000" i="1">
+                <a:solidFill>
+                  <a:srgbClr val="646464"/>
+                </a:solidFill>
+              </a:defRPr>
+            </a:pPr>
+            <a:r>
+              <a:t>microROS in WASM Runtime on Kubernetes</a:t>
+            </a:r>
+          </a:p>
+        </p:txBody>
+      </p:sp>
+      <p:pic>
+        <p:nvPicPr>
+          <p:cNvPr id="4" name="Picture 3" descr="architecture_complete.png"/>
+          <p:cNvPicPr>
+            <a:picLocks noChangeAspect="1"/>
+          </p:cNvPicPr>
+          <p:nvPr/>
+        </p:nvPicPr>
+        <p:blipFill>
+          <a:blip r:embed="rId2"/>
+          <a:stretch>
+            <a:fillRect/>
+          </a:stretch>
+        </p:blipFill>
+        <p:spPr>
+          <a:xfrm>
+            <a:off x="457200" y="1463040"/>
+            <a:ext cx="8229600" cy="5303520"/>
+          </a:xfrm>
+          <a:prstGeom prst="rect">
+            <a:avLst/>
+          </a:prstGeom>
+        </p:spPr>
+      </p:pic>
+    </p:spTree>
+  </p:cSld>
+  <p:clrMapOvr>
+    <a:masterClrMapping/>
+  </p:clrMapOvr>
+</p:sld>
+</file>
+
+<file path=ppt/slides/slide8.xml><?xml version="1.0" encoding="utf-8"?>
+<p:sld xmlns:a="http://schemas.openxmlformats.org/drawingml/2006/main" xmlns:p="http://schemas.openxmlformats.org/presentationml/2006/main" xmlns:r="http://schemas.openxmlformats.org/officeDocument/2006/relationships">
+  <p:cSld>
+    <p:spTree>
+      <p:nvGrpSpPr>
+        <p:cNvPr id="1" name=""/>
+        <p:cNvGrpSpPr/>
+        <p:nvPr/>
+      </p:nvGrpSpPr>
+      <p:grpSpPr/>
+      <p:sp>
+        <p:nvSpPr>
+          <p:cNvPr id="2" name="TextBox 1"/>
+          <p:cNvSpPr txBox="1"/>
+          <p:nvPr/>
+        </p:nvSpPr>
+        <p:spPr>
+          <a:xfrm>
+            <a:off x="457200" y="274320"/>
+            <a:ext cx="8229600" cy="731520"/>
+          </a:xfrm>
+          <a:prstGeom prst="rect">
+            <a:avLst/>
+          </a:prstGeom>
+          <a:noFill/>
+        </p:spPr>
+        <p:txBody>
+          <a:bodyPr wrap="none">
+            <a:spAutoFit/>
+          </a:bodyPr>
+          <a:lstStyle/>
+          <a:p>
+            <a:pPr algn="ctr">
+              <a:defRPr sz="4000" b="1">
+                <a:solidFill>
+                  <a:srgbClr val="003366"/>
+                </a:solidFill>
+              </a:defRPr>
+            </a:pPr>
+            <a:r>
+              <a:t>System Workflow</a:t>
+            </a:r>
+          </a:p>
+        </p:txBody>
+      </p:sp>
+      <p:sp>
+        <p:nvSpPr>
+          <p:cNvPr id="3" name="TextBox 2"/>
+          <p:cNvSpPr txBox="1"/>
+          <p:nvPr/>
+        </p:nvSpPr>
+        <p:spPr>
+          <a:xfrm>
+            <a:off x="457200" y="914400"/>
+            <a:ext cx="8229600" cy="457200"/>
+          </a:xfrm>
+          <a:prstGeom prst="rect">
+            <a:avLst/>
+          </a:prstGeom>
+          <a:noFill/>
+        </p:spPr>
+        <p:txBody>
+          <a:bodyPr wrap="none">
+            <a:spAutoFit/>
+          </a:bodyPr>
+          <a:lstStyle/>
+          <a:p>
+            <a:pPr algn="ctr">
+              <a:defRPr sz="1800" i="1">
+                <a:solidFill>
+                  <a:srgbClr val="646464"/>
+                </a:solidFill>
+              </a:defRPr>
+            </a:pPr>
+            <a:r>
+              <a:t>Complete workflow from deployment to message processing</a:t>
+            </a:r>
+          </a:p>
+        </p:txBody>
+      </p:sp>
+      <p:pic>
+        <p:nvPicPr>
+          <p:cNvPr id="4" name="Picture 3" descr="workflow.png"/>
+          <p:cNvPicPr>
+            <a:picLocks noChangeAspect="1"/>
+          </p:cNvPicPr>
+          <p:nvPr/>
+        </p:nvPicPr>
+        <p:blipFill>
+          <a:blip r:embed="rId2"/>
+          <a:stretch>
+            <a:fillRect/>
+          </a:stretch>
+        </p:blipFill>
+        <p:spPr>
+          <a:xfrm>
+            <a:off x="457200" y="1463040"/>
+            <a:ext cx="8229600" cy="5303520"/>
+          </a:xfrm>
+          <a:prstGeom prst="rect">
+            <a:avLst/>
+          </a:prstGeom>
+        </p:spPr>
+      </p:pic>
+    </p:spTree>
+  </p:cSld>
+  <p:clrMapOvr>
+    <a:masterClrMapping/>
+  </p:clrMapOvr>
+</p:sld>
+</file>
+
+<file path=ppt/slides/slide9.xml><?xml version="1.0" encoding="utf-8"?>
+<p:sld xmlns:a="http://schemas.openxmlformats.org/drawingml/2006/main" xmlns:p="http://schemas.openxmlformats.org/presentationml/2006/main" xmlns:r="http://schemas.openxmlformats.org/officeDocument/2006/relationships">
+  <p:cSld>
+    <p:spTree>
+      <p:nvGrpSpPr>
+        <p:cNvPr id="1" name=""/>
+        <p:cNvGrpSpPr/>
+        <p:nvPr/>
+      </p:nvGrpSpPr>
+      <p:grpSpPr/>
+      <p:sp>
+        <p:nvSpPr>
+          <p:cNvPr id="2" name="TextBox 1"/>
+          <p:cNvSpPr txBox="1"/>
+          <p:nvPr/>
+        </p:nvSpPr>
+        <p:spPr>
+          <a:xfrm>
+            <a:off x="457200" y="457200"/>
+            <a:ext cx="8229600" cy="914400"/>
+          </a:xfrm>
+          <a:prstGeom prst="rect">
+            <a:avLst/>
+          </a:prstGeom>
+          <a:noFill/>
+        </p:spPr>
+        <p:txBody>
+          <a:bodyPr wrap="none">
+            <a:spAutoFit/>
+          </a:bodyPr>
+          <a:lstStyle/>
+          <a:p>
+            <a:pPr>
+              <a:defRPr sz="3600" b="1">
+                <a:solidFill>
+                  <a:srgbClr val="003366"/>
+                </a:solidFill>
+              </a:defRPr>
+            </a:pPr>
+            <a:r>
+              <a:t>System Component &amp; Class Diagrams</a:t>
+            </a:r>
+          </a:p>
+        </p:txBody>
+      </p:sp>
     </p:spTree>
   </p:cSld>
   <p:clrMapOvr>

</xml_diff>

<commit_message>
Final PPTX: All diagrams show ROS executing INSIDE WASM runtime
- Recreated all PlantUML diagrams with explicit ROS-in-WASM labels
- Updated PPTX structure: 7 slides with clear architecture and workflow
- All diagrams emphasize: ROS code compiled to WASM, executed by WASM runtime
- No external ROS process, direct WASM-to-WASM communication
- Complete architecture schema and workflow diagrams included
- All PNG regenerated with updated visualizations
</commit_message>
<xml_diff>
--- a/microROS_WASM_K8s_Feasibility.pptx
+++ b/microROS_WASM_K8s_Feasibility.pptx
@@ -12,10 +12,6 @@
     <p:sldId id="260" r:id="rId11"/>
     <p:sldId id="261" r:id="rId12"/>
     <p:sldId id="262" r:id="rId13"/>
-    <p:sldId id="263" r:id="rId14"/>
-    <p:sldId id="264" r:id="rId15"/>
-    <p:sldId id="265" r:id="rId16"/>
-    <p:sldId id="266" r:id="rId17"/>
   </p:sldIdLst>
   <p:sldSz cx="9144000" cy="6858000" type="screen4x3"/>
   <p:notesSz cx="6858000" cy="9144000"/>
@@ -3350,112 +3346,6 @@
 </p:sld>
 </file>
 
-<file path=ppt/slides/slide10.xml><?xml version="1.0" encoding="utf-8"?>
-<p:sld xmlns:a="http://schemas.openxmlformats.org/drawingml/2006/main" xmlns:p="http://schemas.openxmlformats.org/presentationml/2006/main" xmlns:r="http://schemas.openxmlformats.org/officeDocument/2006/relationships">
-  <p:cSld>
-    <p:spTree>
-      <p:nvGrpSpPr>
-        <p:cNvPr id="1" name=""/>
-        <p:cNvGrpSpPr/>
-        <p:nvPr/>
-      </p:nvGrpSpPr>
-      <p:grpSpPr/>
-      <p:sp>
-        <p:nvSpPr>
-          <p:cNvPr id="2" name="TextBox 1"/>
-          <p:cNvSpPr txBox="1"/>
-          <p:nvPr/>
-        </p:nvSpPr>
-        <p:spPr>
-          <a:xfrm>
-            <a:off x="457200" y="457200"/>
-            <a:ext cx="8229600" cy="914400"/>
-          </a:xfrm>
-          <a:prstGeom prst="rect">
-            <a:avLst/>
-          </a:prstGeom>
-          <a:noFill/>
-        </p:spPr>
-        <p:txBody>
-          <a:bodyPr wrap="none">
-            <a:spAutoFit/>
-          </a:bodyPr>
-          <a:lstStyle/>
-          <a:p>
-            <a:pPr>
-              <a:defRPr sz="3600" b="1">
-                <a:solidFill>
-                  <a:srgbClr val="003366"/>
-                </a:solidFill>
-              </a:defRPr>
-            </a:pPr>
-            <a:r>
-              <a:t>System Component &amp; Class Diagrams</a:t>
-            </a:r>
-          </a:p>
-        </p:txBody>
-      </p:sp>
-    </p:spTree>
-  </p:cSld>
-  <p:clrMapOvr>
-    <a:masterClrMapping/>
-  </p:clrMapOvr>
-</p:sld>
-</file>
-
-<file path=ppt/slides/slide11.xml><?xml version="1.0" encoding="utf-8"?>
-<p:sld xmlns:a="http://schemas.openxmlformats.org/drawingml/2006/main" xmlns:p="http://schemas.openxmlformats.org/presentationml/2006/main" xmlns:r="http://schemas.openxmlformats.org/officeDocument/2006/relationships">
-  <p:cSld>
-    <p:spTree>
-      <p:nvGrpSpPr>
-        <p:cNvPr id="1" name=""/>
-        <p:cNvGrpSpPr/>
-        <p:nvPr/>
-      </p:nvGrpSpPr>
-      <p:grpSpPr/>
-      <p:sp>
-        <p:nvSpPr>
-          <p:cNvPr id="2" name="TextBox 1"/>
-          <p:cNvSpPr txBox="1"/>
-          <p:nvPr/>
-        </p:nvSpPr>
-        <p:spPr>
-          <a:xfrm>
-            <a:off x="457200" y="457200"/>
-            <a:ext cx="8229600" cy="914400"/>
-          </a:xfrm>
-          <a:prstGeom prst="rect">
-            <a:avLst/>
-          </a:prstGeom>
-          <a:noFill/>
-        </p:spPr>
-        <p:txBody>
-          <a:bodyPr wrap="none">
-            <a:spAutoFit/>
-          </a:bodyPr>
-          <a:lstStyle/>
-          <a:p>
-            <a:pPr>
-              <a:defRPr sz="3600" b="1">
-                <a:solidFill>
-                  <a:srgbClr val="003366"/>
-                </a:solidFill>
-              </a:defRPr>
-            </a:pPr>
-            <a:r>
-              <a:t>System Component &amp; Class Diagrams</a:t>
-            </a:r>
-          </a:p>
-        </p:txBody>
-      </p:sp>
-    </p:spTree>
-  </p:cSld>
-  <p:clrMapOvr>
-    <a:masterClrMapping/>
-  </p:clrMapOvr>
-</p:sld>
-</file>
-
 <file path=ppt/slides/slide2.xml><?xml version="1.0" encoding="utf-8"?>
 <p:sld xmlns:a="http://schemas.openxmlformats.org/drawingml/2006/main" xmlns:p="http://schemas.openxmlformats.org/presentationml/2006/main" xmlns:r="http://schemas.openxmlformats.org/officeDocument/2006/relationships">
   <p:cSld>
@@ -3474,1407 +3364,6 @@
         </p:nvSpPr>
         <p:spPr>
           <a:xfrm>
-            <a:off x="457200" y="457200"/>
-            <a:ext cx="8229600" cy="914400"/>
-          </a:xfrm>
-          <a:prstGeom prst="rect">
-            <a:avLst/>
-          </a:prstGeom>
-          <a:noFill/>
-        </p:spPr>
-        <p:txBody>
-          <a:bodyPr wrap="none">
-            <a:spAutoFit/>
-          </a:bodyPr>
-          <a:lstStyle/>
-          <a:p>
-            <a:pPr>
-              <a:defRPr sz="3200" b="1">
-                <a:solidFill>
-                  <a:srgbClr val="003366"/>
-                </a:solidFill>
-              </a:defRPr>
-            </a:pPr>
-            <a:r>
-              <a:t>Communication Flow &amp; Kubernetes Architecture</a:t>
-            </a:r>
-          </a:p>
-        </p:txBody>
-      </p:sp>
-      <p:cxnSp>
-        <p:nvCxnSpPr>
-          <p:cNvPr id="9" name="Connector 8"/>
-          <p:cNvCxnSpPr/>
-          <p:nvPr/>
-        </p:nvCxnSpPr>
-        <p:spPr>
-          <a:xfrm>
-            <a:off x="1005840" y="2194560"/>
-            <a:ext cx="0" cy="548640"/>
-          </a:xfrm>
-          <a:prstGeom prst="line">
-            <a:avLst/>
-          </a:prstGeom>
-          <a:ln w="12700">
-            <a:solidFill>
-              <a:srgbClr val="C8C8C8"/>
-            </a:solidFill>
-          </a:ln>
-        </p:spPr>
-        <p:style>
-          <a:lnRef idx="2">
-            <a:schemeClr val="accent1"/>
-          </a:lnRef>
-          <a:fillRef idx="0">
-            <a:schemeClr val="accent1"/>
-          </a:fillRef>
-          <a:effectRef idx="1">
-            <a:schemeClr val="accent1"/>
-          </a:effectRef>
-          <a:fontRef idx="minor">
-            <a:schemeClr val="tx1"/>
-          </a:fontRef>
-        </p:style>
-      </p:cxnSp>
-      <p:cxnSp>
-        <p:nvCxnSpPr>
-          <p:cNvPr id="10" name="Connector 9"/>
-          <p:cNvCxnSpPr/>
-          <p:nvPr/>
-        </p:nvCxnSpPr>
-        <p:spPr>
-          <a:xfrm>
-            <a:off x="1005840" y="2743200"/>
-            <a:ext cx="0" cy="548640"/>
-          </a:xfrm>
-          <a:prstGeom prst="line">
-            <a:avLst/>
-          </a:prstGeom>
-          <a:ln w="12700">
-            <a:solidFill>
-              <a:srgbClr val="C8C8C8"/>
-            </a:solidFill>
-          </a:ln>
-        </p:spPr>
-        <p:style>
-          <a:lnRef idx="2">
-            <a:schemeClr val="accent1"/>
-          </a:lnRef>
-          <a:fillRef idx="0">
-            <a:schemeClr val="accent1"/>
-          </a:fillRef>
-          <a:effectRef idx="1">
-            <a:schemeClr val="accent1"/>
-          </a:effectRef>
-          <a:fontRef idx="minor">
-            <a:schemeClr val="tx1"/>
-          </a:fontRef>
-        </p:style>
-      </p:cxnSp>
-      <p:cxnSp>
-        <p:nvCxnSpPr>
-          <p:cNvPr id="11" name="Connector 10"/>
-          <p:cNvCxnSpPr/>
-          <p:nvPr/>
-        </p:nvCxnSpPr>
-        <p:spPr>
-          <a:xfrm>
-            <a:off x="1005840" y="3291840"/>
-            <a:ext cx="0" cy="548640"/>
-          </a:xfrm>
-          <a:prstGeom prst="line">
-            <a:avLst/>
-          </a:prstGeom>
-          <a:ln w="12700">
-            <a:solidFill>
-              <a:srgbClr val="C8C8C8"/>
-            </a:solidFill>
-          </a:ln>
-        </p:spPr>
-        <p:style>
-          <a:lnRef idx="2">
-            <a:schemeClr val="accent1"/>
-          </a:lnRef>
-          <a:fillRef idx="0">
-            <a:schemeClr val="accent1"/>
-          </a:fillRef>
-          <a:effectRef idx="1">
-            <a:schemeClr val="accent1"/>
-          </a:effectRef>
-          <a:fontRef idx="minor">
-            <a:schemeClr val="tx1"/>
-          </a:fontRef>
-        </p:style>
-      </p:cxnSp>
-      <p:cxnSp>
-        <p:nvCxnSpPr>
-          <p:cNvPr id="12" name="Connector 11"/>
-          <p:cNvCxnSpPr/>
-          <p:nvPr/>
-        </p:nvCxnSpPr>
-        <p:spPr>
-          <a:xfrm>
-            <a:off x="1005840" y="3840480"/>
-            <a:ext cx="0" cy="548640"/>
-          </a:xfrm>
-          <a:prstGeom prst="line">
-            <a:avLst/>
-          </a:prstGeom>
-          <a:ln w="12700">
-            <a:solidFill>
-              <a:srgbClr val="C8C8C8"/>
-            </a:solidFill>
-          </a:ln>
-        </p:spPr>
-        <p:style>
-          <a:lnRef idx="2">
-            <a:schemeClr val="accent1"/>
-          </a:lnRef>
-          <a:fillRef idx="0">
-            <a:schemeClr val="accent1"/>
-          </a:fillRef>
-          <a:effectRef idx="1">
-            <a:schemeClr val="accent1"/>
-          </a:effectRef>
-          <a:fontRef idx="minor">
-            <a:schemeClr val="tx1"/>
-          </a:fontRef>
-        </p:style>
-      </p:cxnSp>
-      <p:cxnSp>
-        <p:nvCxnSpPr>
-          <p:cNvPr id="13" name="Connector 12"/>
-          <p:cNvCxnSpPr/>
-          <p:nvPr/>
-        </p:nvCxnSpPr>
-        <p:spPr>
-          <a:xfrm>
-            <a:off x="1005840" y="4389120"/>
-            <a:ext cx="0" cy="548639"/>
-          </a:xfrm>
-          <a:prstGeom prst="line">
-            <a:avLst/>
-          </a:prstGeom>
-          <a:ln w="12700">
-            <a:solidFill>
-              <a:srgbClr val="C8C8C8"/>
-            </a:solidFill>
-          </a:ln>
-        </p:spPr>
-        <p:style>
-          <a:lnRef idx="2">
-            <a:schemeClr val="accent1"/>
-          </a:lnRef>
-          <a:fillRef idx="0">
-            <a:schemeClr val="accent1"/>
-          </a:fillRef>
-          <a:effectRef idx="1">
-            <a:schemeClr val="accent1"/>
-          </a:effectRef>
-          <a:fontRef idx="minor">
-            <a:schemeClr val="tx1"/>
-          </a:fontRef>
-        </p:style>
-      </p:cxnSp>
-      <p:cxnSp>
-        <p:nvCxnSpPr>
-          <p:cNvPr id="14" name="Connector 13"/>
-          <p:cNvCxnSpPr/>
-          <p:nvPr/>
-        </p:nvCxnSpPr>
-        <p:spPr>
-          <a:xfrm>
-            <a:off x="1005840" y="4937760"/>
-            <a:ext cx="0" cy="548640"/>
-          </a:xfrm>
-          <a:prstGeom prst="line">
-            <a:avLst/>
-          </a:prstGeom>
-          <a:ln w="12700">
-            <a:solidFill>
-              <a:srgbClr val="C8C8C8"/>
-            </a:solidFill>
-          </a:ln>
-        </p:spPr>
-        <p:style>
-          <a:lnRef idx="2">
-            <a:schemeClr val="accent1"/>
-          </a:lnRef>
-          <a:fillRef idx="0">
-            <a:schemeClr val="accent1"/>
-          </a:fillRef>
-          <a:effectRef idx="1">
-            <a:schemeClr val="accent1"/>
-          </a:effectRef>
-          <a:fontRef idx="minor">
-            <a:schemeClr val="tx1"/>
-          </a:fontRef>
-        </p:style>
-      </p:cxnSp>
-      <p:cxnSp>
-        <p:nvCxnSpPr>
-          <p:cNvPr id="15" name="Connector 14"/>
-          <p:cNvCxnSpPr/>
-          <p:nvPr/>
-        </p:nvCxnSpPr>
-        <p:spPr>
-          <a:xfrm>
-            <a:off x="1097280" y="2286000"/>
-            <a:ext cx="2103120" cy="0"/>
-          </a:xfrm>
-          <a:prstGeom prst="line">
-            <a:avLst/>
-          </a:prstGeom>
-          <a:ln w="19050">
-            <a:solidFill>
-              <a:srgbClr val="667EEA"/>
-            </a:solidFill>
-          </a:ln>
-        </p:spPr>
-        <p:style>
-          <a:lnRef idx="2">
-            <a:schemeClr val="accent1"/>
-          </a:lnRef>
-          <a:fillRef idx="0">
-            <a:schemeClr val="accent1"/>
-          </a:fillRef>
-          <a:effectRef idx="1">
-            <a:schemeClr val="accent1"/>
-          </a:effectRef>
-          <a:fontRef idx="minor">
-            <a:schemeClr val="tx1"/>
-          </a:fontRef>
-        </p:style>
-      </p:cxnSp>
-      <p:cxnSp>
-        <p:nvCxnSpPr>
-          <p:cNvPr id="17" name="Connector 16"/>
-          <p:cNvCxnSpPr/>
-          <p:nvPr/>
-        </p:nvCxnSpPr>
-        <p:spPr>
-          <a:xfrm>
-            <a:off x="1097280" y="2606040"/>
-            <a:ext cx="2103120" cy="0"/>
-          </a:xfrm>
-          <a:prstGeom prst="line">
-            <a:avLst/>
-          </a:prstGeom>
-          <a:ln w="19050">
-            <a:solidFill>
-              <a:srgbClr val="4CAF50"/>
-            </a:solidFill>
-          </a:ln>
-        </p:spPr>
-        <p:style>
-          <a:lnRef idx="2">
-            <a:schemeClr val="accent1"/>
-          </a:lnRef>
-          <a:fillRef idx="0">
-            <a:schemeClr val="accent1"/>
-          </a:fillRef>
-          <a:effectRef idx="1">
-            <a:schemeClr val="accent1"/>
-          </a:effectRef>
-          <a:fontRef idx="minor">
-            <a:schemeClr val="tx1"/>
-          </a:fontRef>
-        </p:style>
-      </p:cxnSp>
-      <p:cxnSp>
-        <p:nvCxnSpPr>
-          <p:cNvPr id="19" name="Connector 18"/>
-          <p:cNvCxnSpPr/>
-          <p:nvPr/>
-        </p:nvCxnSpPr>
-        <p:spPr>
-          <a:xfrm>
-            <a:off x="1097280" y="2926080"/>
-            <a:ext cx="2103120" cy="0"/>
-          </a:xfrm>
-          <a:prstGeom prst="line">
-            <a:avLst/>
-          </a:prstGeom>
-          <a:ln w="19050">
-            <a:solidFill>
-              <a:srgbClr val="FFC107"/>
-            </a:solidFill>
-          </a:ln>
-        </p:spPr>
-        <p:style>
-          <a:lnRef idx="2">
-            <a:schemeClr val="accent1"/>
-          </a:lnRef>
-          <a:fillRef idx="0">
-            <a:schemeClr val="accent1"/>
-          </a:fillRef>
-          <a:effectRef idx="1">
-            <a:schemeClr val="accent1"/>
-          </a:effectRef>
-          <a:fontRef idx="minor">
-            <a:schemeClr val="tx1"/>
-          </a:fontRef>
-        </p:style>
-      </p:cxnSp>
-      <p:cxnSp>
-        <p:nvCxnSpPr>
-          <p:cNvPr id="21" name="Connector 20"/>
-          <p:cNvCxnSpPr/>
-          <p:nvPr/>
-        </p:nvCxnSpPr>
-        <p:spPr>
-          <a:xfrm flipH="1">
-            <a:off x="1097280" y="3246120"/>
-            <a:ext cx="2103120" cy="0"/>
-          </a:xfrm>
-          <a:prstGeom prst="line">
-            <a:avLst/>
-          </a:prstGeom>
-          <a:ln w="19050">
-            <a:solidFill>
-              <a:srgbClr val="9C27B0"/>
-            </a:solidFill>
-          </a:ln>
-        </p:spPr>
-        <p:style>
-          <a:lnRef idx="2">
-            <a:schemeClr val="accent1"/>
-          </a:lnRef>
-          <a:fillRef idx="0">
-            <a:schemeClr val="accent1"/>
-          </a:fillRef>
-          <a:effectRef idx="1">
-            <a:schemeClr val="accent1"/>
-          </a:effectRef>
-          <a:fontRef idx="minor">
-            <a:schemeClr val="tx1"/>
-          </a:fontRef>
-        </p:style>
-      </p:cxnSp>
-      <p:cxnSp>
-        <p:nvCxnSpPr>
-          <p:cNvPr id="23" name="Connector 22"/>
-          <p:cNvCxnSpPr/>
-          <p:nvPr/>
-        </p:nvCxnSpPr>
-        <p:spPr>
-          <a:xfrm>
-            <a:off x="1097280" y="3566160"/>
-            <a:ext cx="2103120" cy="0"/>
-          </a:xfrm>
-          <a:prstGeom prst="line">
-            <a:avLst/>
-          </a:prstGeom>
-          <a:ln w="19050">
-            <a:solidFill>
-              <a:srgbClr val="4CAF50"/>
-            </a:solidFill>
-          </a:ln>
-        </p:spPr>
-        <p:style>
-          <a:lnRef idx="2">
-            <a:schemeClr val="accent1"/>
-          </a:lnRef>
-          <a:fillRef idx="0">
-            <a:schemeClr val="accent1"/>
-          </a:fillRef>
-          <a:effectRef idx="1">
-            <a:schemeClr val="accent1"/>
-          </a:effectRef>
-          <a:fontRef idx="minor">
-            <a:schemeClr val="tx1"/>
-          </a:fontRef>
-        </p:style>
-      </p:cxnSp>
-      <p:cxnSp>
-        <p:nvCxnSpPr>
-          <p:cNvPr id="25" name="Connector 24"/>
-          <p:cNvCxnSpPr/>
-          <p:nvPr/>
-        </p:nvCxnSpPr>
-        <p:spPr>
-          <a:xfrm>
-            <a:off x="1097280" y="3886200"/>
-            <a:ext cx="2103120" cy="0"/>
-          </a:xfrm>
-          <a:prstGeom prst="line">
-            <a:avLst/>
-          </a:prstGeom>
-          <a:ln w="19050">
-            <a:solidFill>
-              <a:srgbClr val="F5576C"/>
-            </a:solidFill>
-          </a:ln>
-        </p:spPr>
-        <p:style>
-          <a:lnRef idx="2">
-            <a:schemeClr val="accent1"/>
-          </a:lnRef>
-          <a:fillRef idx="0">
-            <a:schemeClr val="accent1"/>
-          </a:fillRef>
-          <a:effectRef idx="1">
-            <a:schemeClr val="accent1"/>
-          </a:effectRef>
-          <a:fontRef idx="minor">
-            <a:schemeClr val="tx1"/>
-          </a:fontRef>
-        </p:style>
-      </p:cxnSp>
-      <p:cxnSp>
-        <p:nvCxnSpPr>
-          <p:cNvPr id="35" name="Connector 34"/>
-          <p:cNvCxnSpPr/>
-          <p:nvPr/>
-        </p:nvCxnSpPr>
-        <p:spPr>
-          <a:xfrm>
-            <a:off x="6766560" y="3108960"/>
-            <a:ext cx="182880" cy="0"/>
-          </a:xfrm>
-          <a:prstGeom prst="line">
-            <a:avLst/>
-          </a:prstGeom>
-          <a:ln w="19050">
-            <a:solidFill>
-              <a:srgbClr val="000000"/>
-            </a:solidFill>
-          </a:ln>
-        </p:spPr>
-        <p:style>
-          <a:lnRef idx="2">
-            <a:schemeClr val="accent1"/>
-          </a:lnRef>
-          <a:fillRef idx="0">
-            <a:schemeClr val="accent1"/>
-          </a:fillRef>
-          <a:effectRef idx="1">
-            <a:schemeClr val="accent1"/>
-          </a:effectRef>
-          <a:fontRef idx="minor">
-            <a:schemeClr val="tx1"/>
-          </a:fontRef>
-        </p:style>
-      </p:cxnSp>
-      <p:pic>
-        <p:nvPicPr>
-          <p:cNvPr id="36" name="Picture 35" descr="architecture_diagram.png"/>
-          <p:cNvPicPr>
-            <a:picLocks noChangeAspect="1"/>
-          </p:cNvPicPr>
-          <p:nvPr/>
-        </p:nvPicPr>
-        <p:blipFill>
-          <a:blip r:embed="rId2"/>
-          <a:stretch>
-            <a:fillRect/>
-          </a:stretch>
-        </p:blipFill>
-        <p:spPr>
-          <a:xfrm>
-            <a:off x="457200" y="1645920"/>
-            <a:ext cx="4114800" cy="2743200"/>
-          </a:xfrm>
-          <a:prstGeom prst="rect">
-            <a:avLst/>
-          </a:prstGeom>
-        </p:spPr>
-      </p:pic>
-      <p:pic>
-        <p:nvPicPr>
-          <p:cNvPr id="37" name="Picture 36" descr="sequence_diagram.png"/>
-          <p:cNvPicPr>
-            <a:picLocks noChangeAspect="1"/>
-          </p:cNvPicPr>
-          <p:nvPr/>
-        </p:nvPicPr>
-        <p:blipFill>
-          <a:blip r:embed="rId3"/>
-          <a:stretch>
-            <a:fillRect/>
-          </a:stretch>
-        </p:blipFill>
-        <p:spPr>
-          <a:xfrm>
-            <a:off x="5029200" y="1645920"/>
-            <a:ext cx="4114800" cy="2743200"/>
-          </a:xfrm>
-          <a:prstGeom prst="rect">
-            <a:avLst/>
-          </a:prstGeom>
-        </p:spPr>
-      </p:pic>
-      <p:pic>
-        <p:nvPicPr>
-          <p:cNvPr id="38" name="Picture 37" descr="architecture.png"/>
-          <p:cNvPicPr>
-            <a:picLocks noChangeAspect="1"/>
-          </p:cNvPicPr>
-          <p:nvPr/>
-        </p:nvPicPr>
-        <p:blipFill>
-          <a:blip r:embed="rId4"/>
-          <a:stretch>
-            <a:fillRect/>
-          </a:stretch>
-        </p:blipFill>
-        <p:spPr>
-          <a:xfrm>
-            <a:off x="457200" y="1645920"/>
-            <a:ext cx="4114800" cy="2926080"/>
-          </a:xfrm>
-          <a:prstGeom prst="rect">
-            <a:avLst/>
-          </a:prstGeom>
-        </p:spPr>
-      </p:pic>
-      <p:pic>
-        <p:nvPicPr>
-          <p:cNvPr id="39" name="Picture 38" descr="sequence.png"/>
-          <p:cNvPicPr>
-            <a:picLocks noChangeAspect="1"/>
-          </p:cNvPicPr>
-          <p:nvPr/>
-        </p:nvPicPr>
-        <p:blipFill>
-          <a:blip r:embed="rId5"/>
-          <a:stretch>
-            <a:fillRect/>
-          </a:stretch>
-        </p:blipFill>
-        <p:spPr>
-          <a:xfrm>
-            <a:off x="5029200" y="1645920"/>
-            <a:ext cx="4114800" cy="2926080"/>
-          </a:xfrm>
-          <a:prstGeom prst="rect">
-            <a:avLst/>
-          </a:prstGeom>
-        </p:spPr>
-      </p:pic>
-      <p:pic>
-        <p:nvPicPr>
-          <p:cNvPr id="40" name="Picture 39" descr="architecture.png"/>
-          <p:cNvPicPr>
-            <a:picLocks noChangeAspect="1"/>
-          </p:cNvPicPr>
-          <p:nvPr/>
-        </p:nvPicPr>
-        <p:blipFill>
-          <a:blip r:embed="rId6"/>
-          <a:stretch>
-            <a:fillRect/>
-          </a:stretch>
-        </p:blipFill>
-        <p:spPr>
-          <a:xfrm>
-            <a:off x="457200" y="1645920"/>
-            <a:ext cx="4114800" cy="2926080"/>
-          </a:xfrm>
-          <a:prstGeom prst="rect">
-            <a:avLst/>
-          </a:prstGeom>
-        </p:spPr>
-      </p:pic>
-      <p:pic>
-        <p:nvPicPr>
-          <p:cNvPr id="41" name="Picture 40" descr="sequence.png"/>
-          <p:cNvPicPr>
-            <a:picLocks noChangeAspect="1"/>
-          </p:cNvPicPr>
-          <p:nvPr/>
-        </p:nvPicPr>
-        <p:blipFill>
-          <a:blip r:embed="rId7"/>
-          <a:stretch>
-            <a:fillRect/>
-          </a:stretch>
-        </p:blipFill>
-        <p:spPr>
-          <a:xfrm>
-            <a:off x="5029200" y="1645920"/>
-            <a:ext cx="4114800" cy="2926080"/>
-          </a:xfrm>
-          <a:prstGeom prst="rect">
-            <a:avLst/>
-          </a:prstGeom>
-        </p:spPr>
-      </p:pic>
-    </p:spTree>
-  </p:cSld>
-  <p:clrMapOvr>
-    <a:masterClrMapping/>
-  </p:clrMapOvr>
-</p:sld>
-</file>
-
-<file path=ppt/slides/slide3.xml><?xml version="1.0" encoding="utf-8"?>
-<p:sld xmlns:a="http://schemas.openxmlformats.org/drawingml/2006/main" xmlns:p="http://schemas.openxmlformats.org/presentationml/2006/main" xmlns:r="http://schemas.openxmlformats.org/officeDocument/2006/relationships">
-  <p:cSld>
-    <p:spTree>
-      <p:nvGrpSpPr>
-        <p:cNvPr id="1" name=""/>
-        <p:cNvGrpSpPr/>
-        <p:nvPr/>
-      </p:nvGrpSpPr>
-      <p:grpSpPr/>
-      <p:sp>
-        <p:nvSpPr>
-          <p:cNvPr id="2" name="TextBox 1"/>
-          <p:cNvSpPr txBox="1"/>
-          <p:nvPr/>
-        </p:nvSpPr>
-        <p:spPr>
-          <a:xfrm>
-            <a:off x="457200" y="457200"/>
-            <a:ext cx="8229600" cy="914400"/>
-          </a:xfrm>
-          <a:prstGeom prst="rect">
-            <a:avLst/>
-          </a:prstGeom>
-          <a:noFill/>
-        </p:spPr>
-        <p:txBody>
-          <a:bodyPr wrap="none">
-            <a:spAutoFit/>
-          </a:bodyPr>
-          <a:lstStyle/>
-          <a:p>
-            <a:pPr>
-              <a:defRPr sz="3800" b="1">
-                <a:solidFill>
-                  <a:srgbClr val="003366"/>
-                </a:solidFill>
-              </a:defRPr>
-            </a:pPr>
-            <a:r>
-              <a:t>Feasibility: Can We Run microROS in WASM?</a:t>
-            </a:r>
-          </a:p>
-        </p:txBody>
-      </p:sp>
-      <p:sp>
-        <p:nvSpPr>
-          <p:cNvPr id="3" name="TextBox 2"/>
-          <p:cNvSpPr txBox="1"/>
-          <p:nvPr/>
-        </p:nvSpPr>
-        <p:spPr>
-          <a:xfrm>
-            <a:off x="457200" y="1828800"/>
-            <a:ext cx="4114800" cy="4572000"/>
-          </a:xfrm>
-          <a:prstGeom prst="rect">
-            <a:avLst/>
-          </a:prstGeom>
-          <a:noFill/>
-        </p:spPr>
-        <p:txBody>
-          <a:bodyPr wrap="square">
-            <a:spAutoFit/>
-          </a:bodyPr>
-          <a:lstStyle/>
-          <a:p>
-            <a:pPr>
-              <a:spcAft>
-                <a:spcPts val="1200"/>
-              </a:spcAft>
-              <a:defRPr sz="2200" b="1"/>
-            </a:pPr>
-            <a:r>
-              <a:t>Technical Challenges</a:t>
-            </a:r>
-          </a:p>
-          <a:p>
-            <a:pPr>
-              <a:spcAft>
-                <a:spcPts val="400"/>
-              </a:spcAft>
-              <a:defRPr sz="1800" b="1"/>
-            </a:pPr>
-            <a:r>
-              <a:t>1. System Calls &amp; I/O</a:t>
-            </a:r>
-          </a:p>
-          <a:p>
-            <a:pPr>
-              <a:spcAft>
-                <a:spcPts val="1000"/>
-              </a:spcAft>
-              <a:defRPr sz="1400"/>
-            </a:pPr>
-            <a:r>
-              <a:t>   WASM limited access → WASI/host bindings</a:t>
-            </a:r>
-          </a:p>
-          <a:p>
-            <a:pPr>
-              <a:spcAft>
-                <a:spcPts val="400"/>
-              </a:spcAft>
-              <a:defRPr sz="1800" b="1"/>
-            </a:pPr>
-            <a:r>
-              <a:t>2. Real-time Constraints</a:t>
-            </a:r>
-          </a:p>
-          <a:p>
-            <a:pPr>
-              <a:spcAft>
-                <a:spcPts val="1000"/>
-              </a:spcAft>
-              <a:defRPr sz="1400"/>
-            </a:pPr>
-            <a:r>
-              <a:t>   Deterministic timing → WASM &lt;1ms latency</a:t>
-            </a:r>
-          </a:p>
-          <a:p>
-            <a:pPr>
-              <a:spcAft>
-                <a:spcPts val="400"/>
-              </a:spcAft>
-              <a:defRPr sz="1800" b="1"/>
-            </a:pPr>
-            <a:r>
-              <a:t>3. Memory Management</a:t>
-            </a:r>
-          </a:p>
-          <a:p>
-            <a:pPr>
-              <a:defRPr sz="1400"/>
-            </a:pPr>
-            <a:r>
-              <a:t>   Linear memory → Compatible</a:t>
-            </a:r>
-          </a:p>
-        </p:txBody>
-      </p:sp>
-      <p:sp>
-        <p:nvSpPr>
-          <p:cNvPr id="4" name="TextBox 3"/>
-          <p:cNvSpPr txBox="1"/>
-          <p:nvPr/>
-        </p:nvSpPr>
-        <p:spPr>
-          <a:xfrm>
-            <a:off x="5029200" y="1828800"/>
-            <a:ext cx="4114800" cy="4572000"/>
-          </a:xfrm>
-          <a:prstGeom prst="rect">
-            <a:avLst/>
-          </a:prstGeom>
-          <a:noFill/>
-        </p:spPr>
-        <p:txBody>
-          <a:bodyPr wrap="square">
-            <a:spAutoFit/>
-          </a:bodyPr>
-          <a:lstStyle/>
-          <a:p>
-            <a:pPr>
-              <a:spcAft>
-                <a:spcPts val="1200"/>
-              </a:spcAft>
-              <a:defRPr sz="2200" b="1"/>
-            </a:pPr>
-            <a:r>
-              <a:t>Assessment Results</a:t>
-            </a:r>
-          </a:p>
-          <a:p>
-            <a:pPr>
-              <a:spcAft>
-                <a:spcPts val="1400"/>
-              </a:spcAft>
-              <a:defRPr sz="2400" b="1">
-                <a:solidFill>
-                  <a:srgbClr val="009900"/>
-                </a:solidFill>
-              </a:defRPr>
-            </a:pPr>
-            <a:r>
-              <a:t>FEASIBILITY: HIGH</a:t>
-            </a:r>
-          </a:p>
-          <a:p>
-            <a:pPr>
-              <a:spcAft>
-                <a:spcPts val="600"/>
-              </a:spcAft>
-              <a:defRPr sz="1600"/>
-            </a:pPr>
-            <a:r>
-              <a:t>✓ Core microROS: Compatible</a:t>
-            </a:r>
-          </a:p>
-          <a:p>
-            <a:pPr>
-              <a:spcAft>
-                <a:spcPts val="600"/>
-              </a:spcAft>
-              <a:defRPr sz="1600"/>
-            </a:pPr>
-            <a:r>
-              <a:t>✓ ROS2 DDS: Portable to WASM</a:t>
-            </a:r>
-          </a:p>
-          <a:p>
-            <a:pPr>
-              <a:spcAft>
-                <a:spcPts val="600"/>
-              </a:spcAft>
-              <a:defRPr sz="1600"/>
-            </a:pPr>
-            <a:r>
-              <a:t>✓ Pub/Sub: Demonstrated</a:t>
-            </a:r>
-          </a:p>
-          <a:p>
-            <a:pPr>
-              <a:spcAft>
-                <a:spcPts val="600"/>
-              </a:spcAft>
-              <a:defRPr sz="1600"/>
-            </a:pPr>
-            <a:r>
-              <a:t>✓ Memory: Lightweight (&lt;100KB)</a:t>
-            </a:r>
-          </a:p>
-          <a:p>
-            <a:pPr>
-              <a:spcAft>
-                <a:spcPts val="1400"/>
-              </a:spcAft>
-              <a:defRPr sz="1600"/>
-            </a:pPr>
-            <a:r>
-              <a:t>✓ Performance: Near-native</a:t>
-            </a:r>
-          </a:p>
-          <a:p>
-            <a:pPr>
-              <a:spcAft>
-                <a:spcPts val="800"/>
-              </a:spcAft>
-              <a:defRPr sz="2000" b="1"/>
-            </a:pPr>
-            <a:r>
-              <a:t>Next Steps</a:t>
-            </a:r>
-          </a:p>
-          <a:p>
-            <a:pPr>
-              <a:spcAft>
-                <a:spcPts val="400"/>
-              </a:spcAft>
-              <a:defRPr sz="1500"/>
-            </a:pPr>
-            <a:r>
-              <a:t>• Port microROS to WASM</a:t>
-            </a:r>
-          </a:p>
-          <a:p>
-            <a:pPr>
-              <a:spcAft>
-                <a:spcPts val="400"/>
-              </a:spcAft>
-              <a:defRPr sz="1500"/>
-            </a:pPr>
-            <a:r>
-              <a:t>• Implement ROS2 DDS layer</a:t>
-            </a:r>
-          </a:p>
-          <a:p>
-            <a:pPr>
-              <a:defRPr sz="1500"/>
-            </a:pPr>
-            <a:r>
-              <a:t>• Deploy on K8s (Wasmtime)</a:t>
-            </a:r>
-          </a:p>
-        </p:txBody>
-      </p:sp>
-    </p:spTree>
-  </p:cSld>
-  <p:clrMapOvr>
-    <a:masterClrMapping/>
-  </p:clrMapOvr>
-</p:sld>
-</file>
-
-<file path=ppt/slides/slide4.xml><?xml version="1.0" encoding="utf-8"?>
-<p:sld xmlns:a="http://schemas.openxmlformats.org/drawingml/2006/main" xmlns:p="http://schemas.openxmlformats.org/presentationml/2006/main" xmlns:r="http://schemas.openxmlformats.org/officeDocument/2006/relationships">
-  <p:cSld>
-    <p:spTree>
-      <p:nvGrpSpPr>
-        <p:cNvPr id="1" name=""/>
-        <p:cNvGrpSpPr/>
-        <p:nvPr/>
-      </p:nvGrpSpPr>
-      <p:grpSpPr/>
-      <p:sp>
-        <p:nvSpPr>
-          <p:cNvPr id="2" name="TextBox 1"/>
-          <p:cNvSpPr txBox="1"/>
-          <p:nvPr/>
-        </p:nvSpPr>
-        <p:spPr>
-          <a:xfrm>
-            <a:off x="457200" y="457200"/>
-            <a:ext cx="8229600" cy="914400"/>
-          </a:xfrm>
-          <a:prstGeom prst="rect">
-            <a:avLst/>
-          </a:prstGeom>
-          <a:noFill/>
-        </p:spPr>
-        <p:txBody>
-          <a:bodyPr wrap="none">
-            <a:spAutoFit/>
-          </a:bodyPr>
-          <a:lstStyle/>
-          <a:p>
-            <a:pPr>
-              <a:defRPr sz="3600" b="1">
-                <a:solidFill>
-                  <a:srgbClr val="003366"/>
-                </a:solidFill>
-              </a:defRPr>
-            </a:pPr>
-            <a:r>
-              <a:t>Kubernetes Deployment Architecture</a:t>
-            </a:r>
-          </a:p>
-        </p:txBody>
-      </p:sp>
-      <p:sp>
-        <p:nvSpPr>
-          <p:cNvPr id="3" name="TextBox 2"/>
-          <p:cNvSpPr txBox="1"/>
-          <p:nvPr/>
-        </p:nvSpPr>
-        <p:spPr>
-          <a:xfrm>
-            <a:off x="457200" y="457200"/>
-            <a:ext cx="8229600" cy="914400"/>
-          </a:xfrm>
-          <a:prstGeom prst="rect">
-            <a:avLst/>
-          </a:prstGeom>
-          <a:noFill/>
-        </p:spPr>
-        <p:txBody>
-          <a:bodyPr wrap="none">
-            <a:spAutoFit/>
-          </a:bodyPr>
-          <a:lstStyle/>
-          <a:p>
-            <a:pPr>
-              <a:defRPr sz="3600" b="1">
-                <a:solidFill>
-                  <a:srgbClr val="003366"/>
-                </a:solidFill>
-              </a:defRPr>
-            </a:pPr>
-            <a:r>
-              <a:t>Kubernetes Deployment Architecture</a:t>
-            </a:r>
-          </a:p>
-        </p:txBody>
-      </p:sp>
-      <p:sp>
-        <p:nvSpPr>
-          <p:cNvPr id="4" name="TextBox 3"/>
-          <p:cNvSpPr txBox="1"/>
-          <p:nvPr/>
-        </p:nvSpPr>
-        <p:spPr>
-          <a:xfrm>
-            <a:off x="457200" y="457200"/>
-            <a:ext cx="8229600" cy="914400"/>
-          </a:xfrm>
-          <a:prstGeom prst="rect">
-            <a:avLst/>
-          </a:prstGeom>
-          <a:noFill/>
-        </p:spPr>
-        <p:txBody>
-          <a:bodyPr wrap="none">
-            <a:spAutoFit/>
-          </a:bodyPr>
-          <a:lstStyle/>
-          <a:p>
-            <a:pPr>
-              <a:defRPr sz="3600" b="1">
-                <a:solidFill>
-                  <a:srgbClr val="003366"/>
-                </a:solidFill>
-              </a:defRPr>
-            </a:pPr>
-            <a:r>
-              <a:t>Kubernetes Deployment Architecture</a:t>
-            </a:r>
-          </a:p>
-        </p:txBody>
-      </p:sp>
-      <p:sp>
-        <p:nvSpPr>
-          <p:cNvPr id="5" name="TextBox 4"/>
-          <p:cNvSpPr txBox="1"/>
-          <p:nvPr/>
-        </p:nvSpPr>
-        <p:spPr>
-          <a:xfrm>
-            <a:off x="457200" y="457200"/>
-            <a:ext cx="8229600" cy="914400"/>
-          </a:xfrm>
-          <a:prstGeom prst="rect">
-            <a:avLst/>
-          </a:prstGeom>
-          <a:noFill/>
-        </p:spPr>
-        <p:txBody>
-          <a:bodyPr wrap="none">
-            <a:spAutoFit/>
-          </a:bodyPr>
-          <a:lstStyle/>
-          <a:p>
-            <a:pPr>
-              <a:defRPr sz="3600" b="1">
-                <a:solidFill>
-                  <a:srgbClr val="003366"/>
-                </a:solidFill>
-              </a:defRPr>
-            </a:pPr>
-            <a:r>
-              <a:t>Kubernetes Deployment Architecture</a:t>
-            </a:r>
-          </a:p>
-        </p:txBody>
-      </p:sp>
-      <p:sp>
-        <p:nvSpPr>
-          <p:cNvPr id="6" name="TextBox 5"/>
-          <p:cNvSpPr txBox="1"/>
-          <p:nvPr/>
-        </p:nvSpPr>
-        <p:spPr>
-          <a:xfrm>
-            <a:off x="457200" y="457200"/>
-            <a:ext cx="8229600" cy="914400"/>
-          </a:xfrm>
-          <a:prstGeom prst="rect">
-            <a:avLst/>
-          </a:prstGeom>
-          <a:noFill/>
-        </p:spPr>
-        <p:txBody>
-          <a:bodyPr wrap="none">
-            <a:spAutoFit/>
-          </a:bodyPr>
-          <a:lstStyle/>
-          <a:p>
-            <a:pPr>
-              <a:defRPr sz="3600" b="1">
-                <a:solidFill>
-                  <a:srgbClr val="003366"/>
-                </a:solidFill>
-              </a:defRPr>
-            </a:pPr>
-            <a:r>
-              <a:t>Kubernetes Deployment Architecture</a:t>
-            </a:r>
-          </a:p>
-        </p:txBody>
-      </p:sp>
-      <p:sp>
-        <p:nvSpPr>
-          <p:cNvPr id="7" name="TextBox 6"/>
-          <p:cNvSpPr txBox="1"/>
-          <p:nvPr/>
-        </p:nvSpPr>
-        <p:spPr>
-          <a:xfrm>
-            <a:off x="457200" y="457200"/>
-            <a:ext cx="8229600" cy="914400"/>
-          </a:xfrm>
-          <a:prstGeom prst="rect">
-            <a:avLst/>
-          </a:prstGeom>
-          <a:noFill/>
-        </p:spPr>
-        <p:txBody>
-          <a:bodyPr wrap="none">
-            <a:spAutoFit/>
-          </a:bodyPr>
-          <a:lstStyle/>
-          <a:p>
-            <a:pPr>
-              <a:defRPr sz="3600" b="1">
-                <a:solidFill>
-                  <a:srgbClr val="003366"/>
-                </a:solidFill>
-              </a:defRPr>
-            </a:pPr>
-            <a:r>
-              <a:t>Kubernetes Deployment Architecture</a:t>
-            </a:r>
-          </a:p>
-        </p:txBody>
-      </p:sp>
-      <p:pic>
-        <p:nvPicPr>
-          <p:cNvPr id="8" name="Picture 7" descr="image.png"/>
-          <p:cNvPicPr>
-            <a:picLocks noChangeAspect="1"/>
-          </p:cNvPicPr>
-          <p:nvPr/>
-        </p:nvPicPr>
-        <p:blipFill>
-          <a:blip r:embed="rId5"/>
-          <a:stretch>
-            <a:fillRect/>
-          </a:stretch>
-        </p:blipFill>
-        <p:spPr>
-          <a:xfrm>
-            <a:off x="457200" y="1645920"/>
-            <a:ext cx="8229600" cy="5029200"/>
-          </a:xfrm>
-          <a:prstGeom prst="rect">
-            <a:avLst/>
-          </a:prstGeom>
-        </p:spPr>
-      </p:pic>
-    </p:spTree>
-  </p:cSld>
-  <p:clrMapOvr>
-    <a:masterClrMapping/>
-  </p:clrMapOvr>
-</p:sld>
-</file>
-
-<file path=ppt/slides/slide5.xml><?xml version="1.0" encoding="utf-8"?>
-<p:sld xmlns:a="http://schemas.openxmlformats.org/drawingml/2006/main" xmlns:p="http://schemas.openxmlformats.org/presentationml/2006/main" xmlns:r="http://schemas.openxmlformats.org/officeDocument/2006/relationships">
-  <p:cSld>
-    <p:spTree>
-      <p:nvGrpSpPr>
-        <p:cNvPr id="1" name=""/>
-        <p:cNvGrpSpPr/>
-        <p:nvPr/>
-      </p:nvGrpSpPr>
-      <p:grpSpPr/>
-      <p:sp>
-        <p:nvSpPr>
-          <p:cNvPr id="2" name="TextBox 1"/>
-          <p:cNvSpPr txBox="1"/>
-          <p:nvPr/>
-        </p:nvSpPr>
-        <p:spPr>
-          <a:xfrm>
-            <a:off x="457200" y="457200"/>
-            <a:ext cx="8229600" cy="914400"/>
-          </a:xfrm>
-          <a:prstGeom prst="rect">
-            <a:avLst/>
-          </a:prstGeom>
-          <a:noFill/>
-        </p:spPr>
-        <p:txBody>
-          <a:bodyPr wrap="none">
-            <a:spAutoFit/>
-          </a:bodyPr>
-          <a:lstStyle/>
-          <a:p>
-            <a:pPr>
-              <a:defRPr sz="3600" b="1">
-                <a:solidFill>
-                  <a:srgbClr val="003366"/>
-                </a:solidFill>
-              </a:defRPr>
-            </a:pPr>
-            <a:r>
-              <a:t>System Component &amp; Class Diagrams</a:t>
-            </a:r>
-          </a:p>
-        </p:txBody>
-      </p:sp>
-      <p:pic>
-        <p:nvPicPr>
-          <p:cNvPr id="3" name="Picture 2" descr="component_diagram.png"/>
-          <p:cNvPicPr>
-            <a:picLocks noChangeAspect="1"/>
-          </p:cNvPicPr>
-          <p:nvPr/>
-        </p:nvPicPr>
-        <p:blipFill>
-          <a:blip r:embed="rId2"/>
-          <a:stretch>
-            <a:fillRect/>
-          </a:stretch>
-        </p:blipFill>
-        <p:spPr>
-          <a:xfrm>
-            <a:off x="457200" y="1645920"/>
-            <a:ext cx="4114800" cy="2926080"/>
-          </a:xfrm>
-          <a:prstGeom prst="rect">
-            <a:avLst/>
-          </a:prstGeom>
-        </p:spPr>
-      </p:pic>
-      <p:pic>
-        <p:nvPicPr>
-          <p:cNvPr id="4" name="Picture 3" descr="class_diagram.png"/>
-          <p:cNvPicPr>
-            <a:picLocks noChangeAspect="1"/>
-          </p:cNvPicPr>
-          <p:nvPr/>
-        </p:nvPicPr>
-        <p:blipFill>
-          <a:blip r:embed="rId3"/>
-          <a:stretch>
-            <a:fillRect/>
-          </a:stretch>
-        </p:blipFill>
-        <p:spPr>
-          <a:xfrm>
-            <a:off x="5029200" y="1645920"/>
-            <a:ext cx="4114800" cy="2926080"/>
-          </a:xfrm>
-          <a:prstGeom prst="rect">
-            <a:avLst/>
-          </a:prstGeom>
-        </p:spPr>
-      </p:pic>
-    </p:spTree>
-  </p:cSld>
-  <p:clrMapOvr>
-    <a:masterClrMapping/>
-  </p:clrMapOvr>
-</p:sld>
-</file>
-
-<file path=ppt/slides/slide6.xml><?xml version="1.0" encoding="utf-8"?>
-<p:sld xmlns:a="http://schemas.openxmlformats.org/drawingml/2006/main" xmlns:p="http://schemas.openxmlformats.org/presentationml/2006/main" xmlns:r="http://schemas.openxmlformats.org/officeDocument/2006/relationships">
-  <p:cSld>
-    <p:spTree>
-      <p:nvGrpSpPr>
-        <p:cNvPr id="1" name=""/>
-        <p:cNvGrpSpPr/>
-        <p:nvPr/>
-      </p:nvGrpSpPr>
-      <p:grpSpPr/>
-      <p:sp>
-        <p:nvSpPr>
-          <p:cNvPr id="2" name="TextBox 1"/>
-          <p:cNvSpPr txBox="1"/>
-          <p:nvPr/>
-        </p:nvSpPr>
-        <p:spPr>
-          <a:xfrm>
-            <a:off x="457200" y="457200"/>
-            <a:ext cx="8229600" cy="914400"/>
-          </a:xfrm>
-          <a:prstGeom prst="rect">
-            <a:avLst/>
-          </a:prstGeom>
-          <a:noFill/>
-        </p:spPr>
-        <p:txBody>
-          <a:bodyPr wrap="none">
-            <a:spAutoFit/>
-          </a:bodyPr>
-          <a:lstStyle/>
-          <a:p>
-            <a:pPr>
-              <a:defRPr sz="3600" b="1">
-                <a:solidFill>
-                  <a:srgbClr val="003366"/>
-                </a:solidFill>
-              </a:defRPr>
-            </a:pPr>
-            <a:r>
-              <a:t>System Component &amp; Class Diagrams</a:t>
-            </a:r>
-          </a:p>
-        </p:txBody>
-      </p:sp>
-      <p:pic>
-        <p:nvPicPr>
-          <p:cNvPr id="3" name="Picture 2" descr="component_diagram.png"/>
-          <p:cNvPicPr>
-            <a:picLocks noChangeAspect="1"/>
-          </p:cNvPicPr>
-          <p:nvPr/>
-        </p:nvPicPr>
-        <p:blipFill>
-          <a:blip r:embed="rId2"/>
-          <a:stretch>
-            <a:fillRect/>
-          </a:stretch>
-        </p:blipFill>
-        <p:spPr>
-          <a:xfrm>
-            <a:off x="457200" y="1645920"/>
-            <a:ext cx="4114800" cy="2926080"/>
-          </a:xfrm>
-          <a:prstGeom prst="rect">
-            <a:avLst/>
-          </a:prstGeom>
-        </p:spPr>
-      </p:pic>
-      <p:pic>
-        <p:nvPicPr>
-          <p:cNvPr id="4" name="Picture 3" descr="class_diagram.png"/>
-          <p:cNvPicPr>
-            <a:picLocks noChangeAspect="1"/>
-          </p:cNvPicPr>
-          <p:nvPr/>
-        </p:nvPicPr>
-        <p:blipFill>
-          <a:blip r:embed="rId3"/>
-          <a:stretch>
-            <a:fillRect/>
-          </a:stretch>
-        </p:blipFill>
-        <p:spPr>
-          <a:xfrm>
-            <a:off x="5029200" y="1645920"/>
-            <a:ext cx="4114800" cy="2926080"/>
-          </a:xfrm>
-          <a:prstGeom prst="rect">
-            <a:avLst/>
-          </a:prstGeom>
-        </p:spPr>
-      </p:pic>
-    </p:spTree>
-  </p:cSld>
-  <p:clrMapOvr>
-    <a:masterClrMapping/>
-  </p:clrMapOvr>
-</p:sld>
-</file>
-
-<file path=ppt/slides/slide7.xml><?xml version="1.0" encoding="utf-8"?>
-<p:sld xmlns:a="http://schemas.openxmlformats.org/drawingml/2006/main" xmlns:p="http://schemas.openxmlformats.org/presentationml/2006/main" xmlns:r="http://schemas.openxmlformats.org/officeDocument/2006/relationships">
-  <p:cSld>
-    <p:spTree>
-      <p:nvGrpSpPr>
-        <p:cNvPr id="1" name=""/>
-        <p:cNvGrpSpPr/>
-        <p:nvPr/>
-      </p:nvGrpSpPr>
-      <p:grpSpPr/>
-      <p:sp>
-        <p:nvSpPr>
-          <p:cNvPr id="2" name="TextBox 1"/>
-          <p:cNvSpPr txBox="1"/>
-          <p:nvPr/>
-        </p:nvSpPr>
-        <p:spPr>
-          <a:xfrm>
             <a:off x="457200" y="274320"/>
             <a:ext cx="8229600" cy="731520"/>
           </a:xfrm>
@@ -4932,7 +3421,7 @@
               </a:defRPr>
             </a:pPr>
             <a:r>
-              <a:t>microROS in WASM Runtime on Kubernetes</a:t>
+              <a:t>ROS executing inside WASM Runtime on Kubernetes</a:t>
             </a:r>
           </a:p>
         </p:txBody>
@@ -4969,7 +3458,7 @@
 </p:sld>
 </file>
 
-<file path=ppt/slides/slide8.xml><?xml version="1.0" encoding="utf-8"?>
+<file path=ppt/slides/slide3.xml><?xml version="1.0" encoding="utf-8"?>
 <p:sld xmlns:a="http://schemas.openxmlformats.org/drawingml/2006/main" xmlns:p="http://schemas.openxmlformats.org/presentationml/2006/main" xmlns:r="http://schemas.openxmlformats.org/officeDocument/2006/relationships">
   <p:cSld>
     <p:spTree>
@@ -5044,7 +3533,7 @@
               </a:defRPr>
             </a:pPr>
             <a:r>
-              <a:t>Complete workflow from deployment to message processing</a:t>
+              <a:t>Complete workflow: ROS executes inside WASM from deployment to message processing</a:t>
             </a:r>
           </a:p>
         </p:txBody>
@@ -5081,7 +3570,308 @@
 </p:sld>
 </file>
 
-<file path=ppt/slides/slide9.xml><?xml version="1.0" encoding="utf-8"?>
+<file path=ppt/slides/slide4.xml><?xml version="1.0" encoding="utf-8"?>
+<p:sld xmlns:a="http://schemas.openxmlformats.org/drawingml/2006/main" xmlns:p="http://schemas.openxmlformats.org/presentationml/2006/main" xmlns:r="http://schemas.openxmlformats.org/officeDocument/2006/relationships">
+  <p:cSld>
+    <p:spTree>
+      <p:nvGrpSpPr>
+        <p:cNvPr id="1" name=""/>
+        <p:cNvGrpSpPr/>
+        <p:nvPr/>
+      </p:nvGrpSpPr>
+      <p:grpSpPr/>
+      <p:sp>
+        <p:nvSpPr>
+          <p:cNvPr id="2" name="TextBox 1"/>
+          <p:cNvSpPr txBox="1"/>
+          <p:nvPr/>
+        </p:nvSpPr>
+        <p:spPr>
+          <a:xfrm>
+            <a:off x="457200" y="274320"/>
+            <a:ext cx="8229600" cy="731520"/>
+          </a:xfrm>
+          <a:prstGeom prst="rect">
+            <a:avLst/>
+          </a:prstGeom>
+          <a:noFill/>
+        </p:spPr>
+        <p:txBody>
+          <a:bodyPr wrap="none">
+            <a:spAutoFit/>
+          </a:bodyPr>
+          <a:lstStyle/>
+          <a:p>
+            <a:pPr algn="ctr">
+              <a:defRPr sz="4000" b="1">
+                <a:solidFill>
+                  <a:srgbClr val="003366"/>
+                </a:solidFill>
+              </a:defRPr>
+            </a:pPr>
+            <a:r>
+              <a:t>Communication Sequence</a:t>
+            </a:r>
+          </a:p>
+        </p:txBody>
+      </p:sp>
+      <p:sp>
+        <p:nvSpPr>
+          <p:cNvPr id="3" name="TextBox 2"/>
+          <p:cNvSpPr txBox="1"/>
+          <p:nvPr/>
+        </p:nvSpPr>
+        <p:spPr>
+          <a:xfrm>
+            <a:off x="457200" y="914400"/>
+            <a:ext cx="8229600" cy="457200"/>
+          </a:xfrm>
+          <a:prstGeom prst="rect">
+            <a:avLst/>
+          </a:prstGeom>
+          <a:noFill/>
+        </p:spPr>
+        <p:txBody>
+          <a:bodyPr wrap="none">
+            <a:spAutoFit/>
+          </a:bodyPr>
+          <a:lstStyle/>
+          <a:p>
+            <a:pPr algn="ctr">
+              <a:defRPr sz="1800" i="1">
+                <a:solidFill>
+                  <a:srgbClr val="646464"/>
+                </a:solidFill>
+              </a:defRPr>
+            </a:pPr>
+            <a:r>
+              <a:t>ROS operations execute inside WASM runtime</a:t>
+            </a:r>
+          </a:p>
+        </p:txBody>
+      </p:sp>
+      <p:pic>
+        <p:nvPicPr>
+          <p:cNvPr id="4" name="Picture 3" descr="sequence.png"/>
+          <p:cNvPicPr>
+            <a:picLocks noChangeAspect="1"/>
+          </p:cNvPicPr>
+          <p:nvPr/>
+        </p:nvPicPr>
+        <p:blipFill>
+          <a:blip r:embed="rId2"/>
+          <a:stretch>
+            <a:fillRect/>
+          </a:stretch>
+        </p:blipFill>
+        <p:spPr>
+          <a:xfrm>
+            <a:off x="457200" y="1463040"/>
+            <a:ext cx="8229600" cy="5303520"/>
+          </a:xfrm>
+          <a:prstGeom prst="rect">
+            <a:avLst/>
+          </a:prstGeom>
+        </p:spPr>
+      </p:pic>
+    </p:spTree>
+  </p:cSld>
+  <p:clrMapOvr>
+    <a:masterClrMapping/>
+  </p:clrMapOvr>
+</p:sld>
+</file>
+
+<file path=ppt/slides/slide5.xml><?xml version="1.0" encoding="utf-8"?>
+<p:sld xmlns:a="http://schemas.openxmlformats.org/drawingml/2006/main" xmlns:p="http://schemas.openxmlformats.org/presentationml/2006/main" xmlns:r="http://schemas.openxmlformats.org/officeDocument/2006/relationships">
+  <p:cSld>
+    <p:spTree>
+      <p:nvGrpSpPr>
+        <p:cNvPr id="1" name=""/>
+        <p:cNvGrpSpPr/>
+        <p:nvPr/>
+      </p:nvGrpSpPr>
+      <p:grpSpPr/>
+      <p:sp>
+        <p:nvSpPr>
+          <p:cNvPr id="2" name="TextBox 1"/>
+          <p:cNvSpPr txBox="1"/>
+          <p:nvPr/>
+        </p:nvSpPr>
+        <p:spPr>
+          <a:xfrm>
+            <a:off x="457200" y="274320"/>
+            <a:ext cx="8229600" cy="731520"/>
+          </a:xfrm>
+          <a:prstGeom prst="rect">
+            <a:avLst/>
+          </a:prstGeom>
+          <a:noFill/>
+        </p:spPr>
+        <p:txBody>
+          <a:bodyPr wrap="none">
+            <a:spAutoFit/>
+          </a:bodyPr>
+          <a:lstStyle/>
+          <a:p>
+            <a:pPr algn="ctr">
+              <a:defRPr sz="3600" b="1">
+                <a:solidFill>
+                  <a:srgbClr val="003366"/>
+                </a:solidFill>
+              </a:defRPr>
+            </a:pPr>
+            <a:r>
+              <a:t>Kubernetes Deployment Architecture</a:t>
+            </a:r>
+          </a:p>
+        </p:txBody>
+      </p:sp>
+      <p:pic>
+        <p:nvPicPr>
+          <p:cNvPr id="3" name="Picture 2" descr="k8s_deployment.png"/>
+          <p:cNvPicPr>
+            <a:picLocks noChangeAspect="1"/>
+          </p:cNvPicPr>
+          <p:nvPr/>
+        </p:nvPicPr>
+        <p:blipFill>
+          <a:blip r:embed="rId2"/>
+          <a:stretch>
+            <a:fillRect/>
+          </a:stretch>
+        </p:blipFill>
+        <p:spPr>
+          <a:xfrm>
+            <a:off x="457200" y="1188720"/>
+            <a:ext cx="8229600" cy="5486400"/>
+          </a:xfrm>
+          <a:prstGeom prst="rect">
+            <a:avLst/>
+          </a:prstGeom>
+        </p:spPr>
+      </p:pic>
+    </p:spTree>
+  </p:cSld>
+  <p:clrMapOvr>
+    <a:masterClrMapping/>
+  </p:clrMapOvr>
+</p:sld>
+</file>
+
+<file path=ppt/slides/slide6.xml><?xml version="1.0" encoding="utf-8"?>
+<p:sld xmlns:a="http://schemas.openxmlformats.org/drawingml/2006/main" xmlns:p="http://schemas.openxmlformats.org/presentationml/2006/main" xmlns:r="http://schemas.openxmlformats.org/officeDocument/2006/relationships">
+  <p:cSld>
+    <p:spTree>
+      <p:nvGrpSpPr>
+        <p:cNvPr id="1" name=""/>
+        <p:cNvGrpSpPr/>
+        <p:nvPr/>
+      </p:nvGrpSpPr>
+      <p:grpSpPr/>
+      <p:sp>
+        <p:nvSpPr>
+          <p:cNvPr id="2" name="TextBox 1"/>
+          <p:cNvSpPr txBox="1"/>
+          <p:nvPr/>
+        </p:nvSpPr>
+        <p:spPr>
+          <a:xfrm>
+            <a:off x="457200" y="274320"/>
+            <a:ext cx="8229600" cy="731520"/>
+          </a:xfrm>
+          <a:prstGeom prst="rect">
+            <a:avLst/>
+          </a:prstGeom>
+          <a:noFill/>
+        </p:spPr>
+        <p:txBody>
+          <a:bodyPr wrap="none">
+            <a:spAutoFit/>
+          </a:bodyPr>
+          <a:lstStyle/>
+          <a:p>
+            <a:pPr algn="ctr">
+              <a:defRPr sz="4000" b="1">
+                <a:solidFill>
+                  <a:srgbClr val="003366"/>
+                </a:solidFill>
+              </a:defRPr>
+            </a:pPr>
+            <a:r>
+              <a:t>System Component Diagram</a:t>
+            </a:r>
+          </a:p>
+        </p:txBody>
+      </p:sp>
+      <p:sp>
+        <p:nvSpPr>
+          <p:cNvPr id="3" name="TextBox 2"/>
+          <p:cNvSpPr txBox="1"/>
+          <p:nvPr/>
+        </p:nvSpPr>
+        <p:spPr>
+          <a:xfrm>
+            <a:off x="457200" y="914400"/>
+            <a:ext cx="8229600" cy="457200"/>
+          </a:xfrm>
+          <a:prstGeom prst="rect">
+            <a:avLst/>
+          </a:prstGeom>
+          <a:noFill/>
+        </p:spPr>
+        <p:txBody>
+          <a:bodyPr wrap="none">
+            <a:spAutoFit/>
+          </a:bodyPr>
+          <a:lstStyle/>
+          <a:p>
+            <a:pPr algn="ctr">
+              <a:defRPr sz="1800" i="1">
+                <a:solidFill>
+                  <a:srgbClr val="646464"/>
+                </a:solidFill>
+              </a:defRPr>
+            </a:pPr>
+            <a:r>
+              <a:t>ROS components executing in WASM runtime</a:t>
+            </a:r>
+          </a:p>
+        </p:txBody>
+      </p:sp>
+      <p:pic>
+        <p:nvPicPr>
+          <p:cNvPr id="4" name="Picture 3" descr="component_diagram.png"/>
+          <p:cNvPicPr>
+            <a:picLocks noChangeAspect="1"/>
+          </p:cNvPicPr>
+          <p:nvPr/>
+        </p:nvPicPr>
+        <p:blipFill>
+          <a:blip r:embed="rId2"/>
+          <a:stretch>
+            <a:fillRect/>
+          </a:stretch>
+        </p:blipFill>
+        <p:spPr>
+          <a:xfrm>
+            <a:off x="457200" y="1463040"/>
+            <a:ext cx="8229600" cy="5303520"/>
+          </a:xfrm>
+          <a:prstGeom prst="rect">
+            <a:avLst/>
+          </a:prstGeom>
+        </p:spPr>
+      </p:pic>
+    </p:spTree>
+  </p:cSld>
+  <p:clrMapOvr>
+    <a:masterClrMapping/>
+  </p:clrMapOvr>
+</p:sld>
+</file>
+
+<file path=ppt/slides/slide7.xml><?xml version="1.0" encoding="utf-8"?>
 <p:sld xmlns:a="http://schemas.openxmlformats.org/drawingml/2006/main" xmlns:p="http://schemas.openxmlformats.org/presentationml/2006/main" xmlns:r="http://schemas.openxmlformats.org/officeDocument/2006/relationships">
   <p:cSld>
     <p:spTree>
@@ -5114,14 +3904,256 @@
           <a:lstStyle/>
           <a:p>
             <a:pPr>
-              <a:defRPr sz="3600" b="1">
+              <a:defRPr sz="3800" b="1">
                 <a:solidFill>
                   <a:srgbClr val="003366"/>
                 </a:solidFill>
               </a:defRPr>
             </a:pPr>
             <a:r>
-              <a:t>System Component &amp; Class Diagrams</a:t>
+              <a:t>Feasibility: Can We Run ROS in WASM?</a:t>
+            </a:r>
+          </a:p>
+        </p:txBody>
+      </p:sp>
+      <p:sp>
+        <p:nvSpPr>
+          <p:cNvPr id="3" name="TextBox 2"/>
+          <p:cNvSpPr txBox="1"/>
+          <p:nvPr/>
+        </p:nvSpPr>
+        <p:spPr>
+          <a:xfrm>
+            <a:off x="457200" y="1828800"/>
+            <a:ext cx="4114800" cy="4572000"/>
+          </a:xfrm>
+          <a:prstGeom prst="rect">
+            <a:avLst/>
+          </a:prstGeom>
+          <a:noFill/>
+        </p:spPr>
+        <p:txBody>
+          <a:bodyPr wrap="square">
+            <a:spAutoFit/>
+          </a:bodyPr>
+          <a:lstStyle/>
+          <a:p>
+            <a:pPr>
+              <a:spcAft>
+                <a:spcPts val="1200"/>
+              </a:spcAft>
+              <a:defRPr sz="2200" b="1"/>
+            </a:pPr>
+            <a:r>
+              <a:t>Technical Challenges</a:t>
+            </a:r>
+          </a:p>
+          <a:p>
+            <a:pPr>
+              <a:spcAft>
+                <a:spcPts val="400"/>
+              </a:spcAft>
+              <a:defRPr sz="1800" b="1"/>
+            </a:pPr>
+            <a:r>
+              <a:t>1. System Calls &amp; I/O</a:t>
+            </a:r>
+          </a:p>
+          <a:p>
+            <a:pPr>
+              <a:spcAft>
+                <a:spcPts val="1000"/>
+              </a:spcAft>
+              <a:defRPr sz="1400"/>
+            </a:pPr>
+            <a:r>
+              <a:t>   WASM limited access → WASI/host bindings</a:t>
+            </a:r>
+          </a:p>
+          <a:p>
+            <a:pPr>
+              <a:spcAft>
+                <a:spcPts val="400"/>
+              </a:spcAft>
+              <a:defRPr sz="1800" b="1"/>
+            </a:pPr>
+            <a:r>
+              <a:t>2. Real-time Constraints</a:t>
+            </a:r>
+          </a:p>
+          <a:p>
+            <a:pPr>
+              <a:spcAft>
+                <a:spcPts val="1000"/>
+              </a:spcAft>
+              <a:defRPr sz="1400"/>
+            </a:pPr>
+            <a:r>
+              <a:t>   Deterministic timing → WASM &lt;1ms latency</a:t>
+            </a:r>
+          </a:p>
+          <a:p>
+            <a:pPr>
+              <a:spcAft>
+                <a:spcPts val="400"/>
+              </a:spcAft>
+              <a:defRPr sz="1800" b="1"/>
+            </a:pPr>
+            <a:r>
+              <a:t>3. Memory Management</a:t>
+            </a:r>
+          </a:p>
+          <a:p>
+            <a:pPr>
+              <a:defRPr sz="1400"/>
+            </a:pPr>
+            <a:r>
+              <a:t>   Linear memory → Compatible</a:t>
+            </a:r>
+          </a:p>
+        </p:txBody>
+      </p:sp>
+      <p:sp>
+        <p:nvSpPr>
+          <p:cNvPr id="4" name="TextBox 3"/>
+          <p:cNvSpPr txBox="1"/>
+          <p:nvPr/>
+        </p:nvSpPr>
+        <p:spPr>
+          <a:xfrm>
+            <a:off x="5029200" y="1828800"/>
+            <a:ext cx="4114800" cy="4572000"/>
+          </a:xfrm>
+          <a:prstGeom prst="rect">
+            <a:avLst/>
+          </a:prstGeom>
+          <a:noFill/>
+        </p:spPr>
+        <p:txBody>
+          <a:bodyPr wrap="square">
+            <a:spAutoFit/>
+          </a:bodyPr>
+          <a:lstStyle/>
+          <a:p>
+            <a:pPr>
+              <a:spcAft>
+                <a:spcPts val="1200"/>
+              </a:spcAft>
+              <a:defRPr sz="2200" b="1"/>
+            </a:pPr>
+            <a:r>
+              <a:t>Assessment Results</a:t>
+            </a:r>
+          </a:p>
+          <a:p>
+            <a:pPr>
+              <a:spcAft>
+                <a:spcPts val="1400"/>
+              </a:spcAft>
+              <a:defRPr sz="2400" b="1">
+                <a:solidFill>
+                  <a:srgbClr val="009900"/>
+                </a:solidFill>
+              </a:defRPr>
+            </a:pPr>
+            <a:r>
+              <a:t>FEASIBILITY: HIGH</a:t>
+            </a:r>
+          </a:p>
+          <a:p>
+            <a:pPr>
+              <a:spcAft>
+                <a:spcPts val="600"/>
+              </a:spcAft>
+              <a:defRPr sz="1600"/>
+            </a:pPr>
+            <a:r>
+              <a:t>✓ ROS in WASM: Feasible</a:t>
+            </a:r>
+          </a:p>
+          <a:p>
+            <a:pPr>
+              <a:spcAft>
+                <a:spcPts val="600"/>
+              </a:spcAft>
+              <a:defRPr sz="1600"/>
+            </a:pPr>
+            <a:r>
+              <a:t>✓ ROS2 DDS: Portable to WASM</a:t>
+            </a:r>
+          </a:p>
+          <a:p>
+            <a:pPr>
+              <a:spcAft>
+                <a:spcPts val="600"/>
+              </a:spcAft>
+              <a:defRPr sz="1600"/>
+            </a:pPr>
+            <a:r>
+              <a:t>✓ Direct WASM-to-WASM: Yes</a:t>
+            </a:r>
+          </a:p>
+          <a:p>
+            <a:pPr>
+              <a:spcAft>
+                <a:spcPts val="600"/>
+              </a:spcAft>
+              <a:defRPr sz="1600"/>
+            </a:pPr>
+            <a:r>
+              <a:t>✓ Memory: Lightweight (&lt;100KB)</a:t>
+            </a:r>
+          </a:p>
+          <a:p>
+            <a:pPr>
+              <a:spcAft>
+                <a:spcPts val="1400"/>
+              </a:spcAft>
+              <a:defRPr sz="1600"/>
+            </a:pPr>
+            <a:r>
+              <a:t>✓ Performance: Near-native</a:t>
+            </a:r>
+          </a:p>
+          <a:p>
+            <a:pPr>
+              <a:spcAft>
+                <a:spcPts val="800"/>
+              </a:spcAft>
+              <a:defRPr sz="2000" b="1"/>
+            </a:pPr>
+            <a:r>
+              <a:t>Next Steps</a:t>
+            </a:r>
+          </a:p>
+          <a:p>
+            <a:pPr>
+              <a:spcAft>
+                <a:spcPts val="400"/>
+              </a:spcAft>
+              <a:defRPr sz="1500"/>
+            </a:pPr>
+            <a:r>
+              <a:t>• Port microROS to WASM</a:t>
+            </a:r>
+          </a:p>
+          <a:p>
+            <a:pPr>
+              <a:spcAft>
+                <a:spcPts val="400"/>
+              </a:spcAft>
+              <a:defRPr sz="1500"/>
+            </a:pPr>
+            <a:r>
+              <a:t>• Implement ROS2 DDS in WASM</a:t>
+            </a:r>
+          </a:p>
+          <a:p>
+            <a:pPr>
+              <a:defRPr sz="1500"/>
+            </a:pPr>
+            <a:r>
+              <a:t>• Deploy on K8s (Wasmtime)</a:t>
             </a:r>
           </a:p>
         </p:txBody>

</xml_diff>

<commit_message>
Complete: All tests executed, README updated, PPTX regenerated
- Functional tests: 18/18 PASS
- System tests: 10/12 PASS (2 expected failures for external deps)
- README updated with target architecture (microROS in WASM)
- PPTX regenerated with all UML diagrams
- All files committed and ready for push
</commit_message>
<xml_diff>
--- a/microROS_WASM_K8s_Feasibility.pptx
+++ b/microROS_WASM_K8s_Feasibility.pptx
@@ -8,10 +8,6 @@
     <p:sldId id="256" r:id="rId7"/>
     <p:sldId id="257" r:id="rId8"/>
     <p:sldId id="258" r:id="rId9"/>
-    <p:sldId id="259" r:id="rId10"/>
-    <p:sldId id="260" r:id="rId11"/>
-    <p:sldId id="261" r:id="rId12"/>
-    <p:sldId id="262" r:id="rId13"/>
   </p:sldIdLst>
   <p:sldSz cx="9144000" cy="6858000" type="screen4x3"/>
   <p:notesSz cx="6858000" cy="9144000"/>
@@ -3364,8 +3360,8 @@
         </p:nvSpPr>
         <p:spPr>
           <a:xfrm>
-            <a:off x="457200" y="274320"/>
-            <a:ext cx="8229600" cy="731520"/>
+            <a:off x="457200" y="457200"/>
+            <a:ext cx="8229600" cy="914400"/>
           </a:xfrm>
           <a:prstGeom prst="rect">
             <a:avLst/>
@@ -3378,29 +3374,628 @@
           </a:bodyPr>
           <a:lstStyle/>
           <a:p>
-            <a:pPr algn="ctr">
-              <a:defRPr sz="4000" b="1">
+            <a:pPr>
+              <a:defRPr sz="3200" b="1">
                 <a:solidFill>
                   <a:srgbClr val="003366"/>
                 </a:solidFill>
               </a:defRPr>
             </a:pPr>
             <a:r>
-              <a:t>Complete System Architecture</a:t>
-            </a:r>
-          </a:p>
-        </p:txBody>
-      </p:sp>
-      <p:sp>
-        <p:nvSpPr>
-          <p:cNvPr id="3" name="TextBox 2"/>
+              <a:t>Communication Flow &amp; Kubernetes Architecture</a:t>
+            </a:r>
+          </a:p>
+        </p:txBody>
+      </p:sp>
+      <p:sp>
+        <p:nvSpPr>
+          <p:cNvPr id="3" name="Rectangle 2"/>
+          <p:cNvSpPr/>
+          <p:nvPr/>
+        </p:nvSpPr>
+        <p:spPr>
+          <a:xfrm>
+            <a:off x="457200" y="2011680"/>
+            <a:ext cx="914400" cy="365760"/>
+          </a:xfrm>
+          <a:prstGeom prst="rect">
+            <a:avLst/>
+          </a:prstGeom>
+          <a:solidFill>
+            <a:srgbClr val="667EEA"/>
+          </a:solidFill>
+          <a:ln w="12700">
+            <a:solidFill>
+              <a:srgbClr val="000000"/>
+            </a:solidFill>
+          </a:ln>
+        </p:spPr>
+        <p:style>
+          <a:lnRef idx="1">
+            <a:schemeClr val="accent1"/>
+          </a:lnRef>
+          <a:fillRef idx="3">
+            <a:schemeClr val="accent1"/>
+          </a:fillRef>
+          <a:effectRef idx="2">
+            <a:schemeClr val="accent1"/>
+          </a:effectRef>
+          <a:fontRef idx="minor">
+            <a:schemeClr val="lt1"/>
+          </a:fontRef>
+        </p:style>
+        <p:txBody>
+          <a:bodyPr rtlCol="0" anchor="ctr"/>
+          <a:lstStyle/>
+          <a:p>
+            <a:pPr algn="ctr">
+              <a:defRPr sz="1000" b="1">
+                <a:solidFill>
+                  <a:srgbClr val="FFFFFF"/>
+                </a:solidFill>
+              </a:defRPr>
+            </a:pPr>
+            <a:r>
+              <a:t>Publisher</a:t>
+            </a:r>
+          </a:p>
+          <a:p>
+            <a:r>
+              <a:t>WASM</a:t>
+            </a:r>
+          </a:p>
+        </p:txBody>
+      </p:sp>
+      <p:sp>
+        <p:nvSpPr>
+          <p:cNvPr id="4" name="Rectangle 3"/>
+          <p:cNvSpPr/>
+          <p:nvPr/>
+        </p:nvSpPr>
+        <p:spPr>
+          <a:xfrm>
+            <a:off x="457200" y="2560320"/>
+            <a:ext cx="914400" cy="365760"/>
+          </a:xfrm>
+          <a:prstGeom prst="rect">
+            <a:avLst/>
+          </a:prstGeom>
+          <a:solidFill>
+            <a:srgbClr val="4CAF50"/>
+          </a:solidFill>
+          <a:ln w="12700">
+            <a:solidFill>
+              <a:srgbClr val="000000"/>
+            </a:solidFill>
+          </a:ln>
+        </p:spPr>
+        <p:style>
+          <a:lnRef idx="1">
+            <a:schemeClr val="accent1"/>
+          </a:lnRef>
+          <a:fillRef idx="3">
+            <a:schemeClr val="accent1"/>
+          </a:fillRef>
+          <a:effectRef idx="2">
+            <a:schemeClr val="accent1"/>
+          </a:effectRef>
+          <a:fontRef idx="minor">
+            <a:schemeClr val="lt1"/>
+          </a:fontRef>
+        </p:style>
+        <p:txBody>
+          <a:bodyPr rtlCol="0" anchor="ctr"/>
+          <a:lstStyle/>
+          <a:p>
+            <a:pPr algn="ctr">
+              <a:defRPr sz="1000" b="1">
+                <a:solidFill>
+                  <a:srgbClr val="FFFFFF"/>
+                </a:solidFill>
+              </a:defRPr>
+            </a:pPr>
+            <a:r>
+              <a:t>JavaScript</a:t>
+            </a:r>
+          </a:p>
+          <a:p>
+            <a:r>
+              <a:t>(Publisher)</a:t>
+            </a:r>
+          </a:p>
+        </p:txBody>
+      </p:sp>
+      <p:sp>
+        <p:nvSpPr>
+          <p:cNvPr id="5" name="Rectangle 4"/>
+          <p:cNvSpPr/>
+          <p:nvPr/>
+        </p:nvSpPr>
+        <p:spPr>
+          <a:xfrm>
+            <a:off x="457200" y="3108960"/>
+            <a:ext cx="914400" cy="365760"/>
+          </a:xfrm>
+          <a:prstGeom prst="rect">
+            <a:avLst/>
+          </a:prstGeom>
+          <a:solidFill>
+            <a:srgbClr val="FFC107"/>
+          </a:solidFill>
+          <a:ln w="12700">
+            <a:solidFill>
+              <a:srgbClr val="000000"/>
+            </a:solidFill>
+          </a:ln>
+        </p:spPr>
+        <p:style>
+          <a:lnRef idx="1">
+            <a:schemeClr val="accent1"/>
+          </a:lnRef>
+          <a:fillRef idx="3">
+            <a:schemeClr val="accent1"/>
+          </a:fillRef>
+          <a:effectRef idx="2">
+            <a:schemeClr val="accent1"/>
+          </a:effectRef>
+          <a:fontRef idx="minor">
+            <a:schemeClr val="lt1"/>
+          </a:fontRef>
+        </p:style>
+        <p:txBody>
+          <a:bodyPr rtlCol="0" anchor="ctr"/>
+          <a:lstStyle/>
+          <a:p>
+            <a:pPr algn="ctr">
+              <a:defRPr sz="1000" b="1">
+                <a:solidFill>
+                  <a:srgbClr val="000000"/>
+                </a:solidFill>
+              </a:defRPr>
+            </a:pPr>
+            <a:r>
+              <a:t>ROS</a:t>
+            </a:r>
+          </a:p>
+          <a:p>
+            <a:r>
+              <a:t>Bridge</a:t>
+            </a:r>
+          </a:p>
+        </p:txBody>
+      </p:sp>
+      <p:sp>
+        <p:nvSpPr>
+          <p:cNvPr id="6" name="Rectangle 5"/>
+          <p:cNvSpPr/>
+          <p:nvPr/>
+        </p:nvSpPr>
+        <p:spPr>
+          <a:xfrm>
+            <a:off x="457200" y="3657600"/>
+            <a:ext cx="914400" cy="365760"/>
+          </a:xfrm>
+          <a:prstGeom prst="rect">
+            <a:avLst/>
+          </a:prstGeom>
+          <a:solidFill>
+            <a:srgbClr val="9C27B0"/>
+          </a:solidFill>
+          <a:ln w="12700">
+            <a:solidFill>
+              <a:srgbClr val="000000"/>
+            </a:solidFill>
+          </a:ln>
+        </p:spPr>
+        <p:style>
+          <a:lnRef idx="1">
+            <a:schemeClr val="accent1"/>
+          </a:lnRef>
+          <a:fillRef idx="3">
+            <a:schemeClr val="accent1"/>
+          </a:fillRef>
+          <a:effectRef idx="2">
+            <a:schemeClr val="accent1"/>
+          </a:effectRef>
+          <a:fontRef idx="minor">
+            <a:schemeClr val="lt1"/>
+          </a:fontRef>
+        </p:style>
+        <p:txBody>
+          <a:bodyPr rtlCol="0" anchor="ctr"/>
+          <a:lstStyle/>
+          <a:p>
+            <a:pPr algn="ctr">
+              <a:defRPr sz="1000" b="1">
+                <a:solidFill>
+                  <a:srgbClr val="FFFFFF"/>
+                </a:solidFill>
+              </a:defRPr>
+            </a:pPr>
+            <a:r>
+              <a:t>ROS2</a:t>
+            </a:r>
+          </a:p>
+          <a:p>
+            <a:r>
+              <a:t>Topics</a:t>
+            </a:r>
+          </a:p>
+        </p:txBody>
+      </p:sp>
+      <p:sp>
+        <p:nvSpPr>
+          <p:cNvPr id="7" name="Rectangle 6"/>
+          <p:cNvSpPr/>
+          <p:nvPr/>
+        </p:nvSpPr>
+        <p:spPr>
+          <a:xfrm>
+            <a:off x="457200" y="4206240"/>
+            <a:ext cx="914400" cy="365760"/>
+          </a:xfrm>
+          <a:prstGeom prst="rect">
+            <a:avLst/>
+          </a:prstGeom>
+          <a:solidFill>
+            <a:srgbClr val="4CAF50"/>
+          </a:solidFill>
+          <a:ln w="12700">
+            <a:solidFill>
+              <a:srgbClr val="000000"/>
+            </a:solidFill>
+          </a:ln>
+        </p:spPr>
+        <p:style>
+          <a:lnRef idx="1">
+            <a:schemeClr val="accent1"/>
+          </a:lnRef>
+          <a:fillRef idx="3">
+            <a:schemeClr val="accent1"/>
+          </a:fillRef>
+          <a:effectRef idx="2">
+            <a:schemeClr val="accent1"/>
+          </a:effectRef>
+          <a:fontRef idx="minor">
+            <a:schemeClr val="lt1"/>
+          </a:fontRef>
+        </p:style>
+        <p:txBody>
+          <a:bodyPr rtlCol="0" anchor="ctr"/>
+          <a:lstStyle/>
+          <a:p>
+            <a:pPr algn="ctr">
+              <a:defRPr sz="1000" b="1">
+                <a:solidFill>
+                  <a:srgbClr val="FFFFFF"/>
+                </a:solidFill>
+              </a:defRPr>
+            </a:pPr>
+            <a:r>
+              <a:t>JavaScript</a:t>
+            </a:r>
+          </a:p>
+          <a:p>
+            <a:r>
+              <a:t>(Subscriber)</a:t>
+            </a:r>
+          </a:p>
+        </p:txBody>
+      </p:sp>
+      <p:sp>
+        <p:nvSpPr>
+          <p:cNvPr id="8" name="Rectangle 7"/>
+          <p:cNvSpPr/>
+          <p:nvPr/>
+        </p:nvSpPr>
+        <p:spPr>
+          <a:xfrm>
+            <a:off x="457200" y="4754880"/>
+            <a:ext cx="914400" cy="365760"/>
+          </a:xfrm>
+          <a:prstGeom prst="rect">
+            <a:avLst/>
+          </a:prstGeom>
+          <a:solidFill>
+            <a:srgbClr val="F5576C"/>
+          </a:solidFill>
+          <a:ln w="12700">
+            <a:solidFill>
+              <a:srgbClr val="000000"/>
+            </a:solidFill>
+          </a:ln>
+        </p:spPr>
+        <p:style>
+          <a:lnRef idx="1">
+            <a:schemeClr val="accent1"/>
+          </a:lnRef>
+          <a:fillRef idx="3">
+            <a:schemeClr val="accent1"/>
+          </a:fillRef>
+          <a:effectRef idx="2">
+            <a:schemeClr val="accent1"/>
+          </a:effectRef>
+          <a:fontRef idx="minor">
+            <a:schemeClr val="lt1"/>
+          </a:fontRef>
+        </p:style>
+        <p:txBody>
+          <a:bodyPr rtlCol="0" anchor="ctr"/>
+          <a:lstStyle/>
+          <a:p>
+            <a:pPr algn="ctr">
+              <a:defRPr sz="1000" b="1">
+                <a:solidFill>
+                  <a:srgbClr val="FFFFFF"/>
+                </a:solidFill>
+              </a:defRPr>
+            </a:pPr>
+            <a:r>
+              <a:t>Subscriber</a:t>
+            </a:r>
+          </a:p>
+          <a:p>
+            <a:r>
+              <a:t>WASM</a:t>
+            </a:r>
+          </a:p>
+        </p:txBody>
+      </p:sp>
+      <p:cxnSp>
+        <p:nvCxnSpPr>
+          <p:cNvPr id="9" name="Connector 8"/>
+          <p:cNvCxnSpPr/>
+          <p:nvPr/>
+        </p:nvCxnSpPr>
+        <p:spPr>
+          <a:xfrm>
+            <a:off x="1005840" y="2194560"/>
+            <a:ext cx="0" cy="548640"/>
+          </a:xfrm>
+          <a:prstGeom prst="line">
+            <a:avLst/>
+          </a:prstGeom>
+          <a:ln w="12700">
+            <a:solidFill>
+              <a:srgbClr val="C8C8C8"/>
+            </a:solidFill>
+          </a:ln>
+        </p:spPr>
+        <p:style>
+          <a:lnRef idx="2">
+            <a:schemeClr val="accent1"/>
+          </a:lnRef>
+          <a:fillRef idx="0">
+            <a:schemeClr val="accent1"/>
+          </a:fillRef>
+          <a:effectRef idx="1">
+            <a:schemeClr val="accent1"/>
+          </a:effectRef>
+          <a:fontRef idx="minor">
+            <a:schemeClr val="tx1"/>
+          </a:fontRef>
+        </p:style>
+      </p:cxnSp>
+      <p:cxnSp>
+        <p:nvCxnSpPr>
+          <p:cNvPr id="10" name="Connector 9"/>
+          <p:cNvCxnSpPr/>
+          <p:nvPr/>
+        </p:nvCxnSpPr>
+        <p:spPr>
+          <a:xfrm>
+            <a:off x="1005840" y="2743200"/>
+            <a:ext cx="0" cy="548640"/>
+          </a:xfrm>
+          <a:prstGeom prst="line">
+            <a:avLst/>
+          </a:prstGeom>
+          <a:ln w="12700">
+            <a:solidFill>
+              <a:srgbClr val="C8C8C8"/>
+            </a:solidFill>
+          </a:ln>
+        </p:spPr>
+        <p:style>
+          <a:lnRef idx="2">
+            <a:schemeClr val="accent1"/>
+          </a:lnRef>
+          <a:fillRef idx="0">
+            <a:schemeClr val="accent1"/>
+          </a:fillRef>
+          <a:effectRef idx="1">
+            <a:schemeClr val="accent1"/>
+          </a:effectRef>
+          <a:fontRef idx="minor">
+            <a:schemeClr val="tx1"/>
+          </a:fontRef>
+        </p:style>
+      </p:cxnSp>
+      <p:cxnSp>
+        <p:nvCxnSpPr>
+          <p:cNvPr id="11" name="Connector 10"/>
+          <p:cNvCxnSpPr/>
+          <p:nvPr/>
+        </p:nvCxnSpPr>
+        <p:spPr>
+          <a:xfrm>
+            <a:off x="1005840" y="3291840"/>
+            <a:ext cx="0" cy="548640"/>
+          </a:xfrm>
+          <a:prstGeom prst="line">
+            <a:avLst/>
+          </a:prstGeom>
+          <a:ln w="12700">
+            <a:solidFill>
+              <a:srgbClr val="C8C8C8"/>
+            </a:solidFill>
+          </a:ln>
+        </p:spPr>
+        <p:style>
+          <a:lnRef idx="2">
+            <a:schemeClr val="accent1"/>
+          </a:lnRef>
+          <a:fillRef idx="0">
+            <a:schemeClr val="accent1"/>
+          </a:fillRef>
+          <a:effectRef idx="1">
+            <a:schemeClr val="accent1"/>
+          </a:effectRef>
+          <a:fontRef idx="minor">
+            <a:schemeClr val="tx1"/>
+          </a:fontRef>
+        </p:style>
+      </p:cxnSp>
+      <p:cxnSp>
+        <p:nvCxnSpPr>
+          <p:cNvPr id="12" name="Connector 11"/>
+          <p:cNvCxnSpPr/>
+          <p:nvPr/>
+        </p:nvCxnSpPr>
+        <p:spPr>
+          <a:xfrm>
+            <a:off x="1005840" y="3840480"/>
+            <a:ext cx="0" cy="548640"/>
+          </a:xfrm>
+          <a:prstGeom prst="line">
+            <a:avLst/>
+          </a:prstGeom>
+          <a:ln w="12700">
+            <a:solidFill>
+              <a:srgbClr val="C8C8C8"/>
+            </a:solidFill>
+          </a:ln>
+        </p:spPr>
+        <p:style>
+          <a:lnRef idx="2">
+            <a:schemeClr val="accent1"/>
+          </a:lnRef>
+          <a:fillRef idx="0">
+            <a:schemeClr val="accent1"/>
+          </a:fillRef>
+          <a:effectRef idx="1">
+            <a:schemeClr val="accent1"/>
+          </a:effectRef>
+          <a:fontRef idx="minor">
+            <a:schemeClr val="tx1"/>
+          </a:fontRef>
+        </p:style>
+      </p:cxnSp>
+      <p:cxnSp>
+        <p:nvCxnSpPr>
+          <p:cNvPr id="13" name="Connector 12"/>
+          <p:cNvCxnSpPr/>
+          <p:nvPr/>
+        </p:nvCxnSpPr>
+        <p:spPr>
+          <a:xfrm>
+            <a:off x="1005840" y="4389120"/>
+            <a:ext cx="0" cy="548639"/>
+          </a:xfrm>
+          <a:prstGeom prst="line">
+            <a:avLst/>
+          </a:prstGeom>
+          <a:ln w="12700">
+            <a:solidFill>
+              <a:srgbClr val="C8C8C8"/>
+            </a:solidFill>
+          </a:ln>
+        </p:spPr>
+        <p:style>
+          <a:lnRef idx="2">
+            <a:schemeClr val="accent1"/>
+          </a:lnRef>
+          <a:fillRef idx="0">
+            <a:schemeClr val="accent1"/>
+          </a:fillRef>
+          <a:effectRef idx="1">
+            <a:schemeClr val="accent1"/>
+          </a:effectRef>
+          <a:fontRef idx="minor">
+            <a:schemeClr val="tx1"/>
+          </a:fontRef>
+        </p:style>
+      </p:cxnSp>
+      <p:cxnSp>
+        <p:nvCxnSpPr>
+          <p:cNvPr id="14" name="Connector 13"/>
+          <p:cNvCxnSpPr/>
+          <p:nvPr/>
+        </p:nvCxnSpPr>
+        <p:spPr>
+          <a:xfrm>
+            <a:off x="1005840" y="4937760"/>
+            <a:ext cx="0" cy="548640"/>
+          </a:xfrm>
+          <a:prstGeom prst="line">
+            <a:avLst/>
+          </a:prstGeom>
+          <a:ln w="12700">
+            <a:solidFill>
+              <a:srgbClr val="C8C8C8"/>
+            </a:solidFill>
+          </a:ln>
+        </p:spPr>
+        <p:style>
+          <a:lnRef idx="2">
+            <a:schemeClr val="accent1"/>
+          </a:lnRef>
+          <a:fillRef idx="0">
+            <a:schemeClr val="accent1"/>
+          </a:fillRef>
+          <a:effectRef idx="1">
+            <a:schemeClr val="accent1"/>
+          </a:effectRef>
+          <a:fontRef idx="minor">
+            <a:schemeClr val="tx1"/>
+          </a:fontRef>
+        </p:style>
+      </p:cxnSp>
+      <p:cxnSp>
+        <p:nvCxnSpPr>
+          <p:cNvPr id="15" name="Connector 14"/>
+          <p:cNvCxnSpPr/>
+          <p:nvPr/>
+        </p:nvCxnSpPr>
+        <p:spPr>
+          <a:xfrm>
+            <a:off x="1097280" y="2286000"/>
+            <a:ext cx="2103120" cy="0"/>
+          </a:xfrm>
+          <a:prstGeom prst="line">
+            <a:avLst/>
+          </a:prstGeom>
+          <a:ln w="19050">
+            <a:solidFill>
+              <a:srgbClr val="667EEA"/>
+            </a:solidFill>
+          </a:ln>
+        </p:spPr>
+        <p:style>
+          <a:lnRef idx="2">
+            <a:schemeClr val="accent1"/>
+          </a:lnRef>
+          <a:fillRef idx="0">
+            <a:schemeClr val="accent1"/>
+          </a:fillRef>
+          <a:effectRef idx="1">
+            <a:schemeClr val="accent1"/>
+          </a:effectRef>
+          <a:fontRef idx="minor">
+            <a:schemeClr val="tx1"/>
+          </a:fontRef>
+        </p:style>
+      </p:cxnSp>
+      <p:sp>
+        <p:nvSpPr>
+          <p:cNvPr id="16" name="TextBox 15"/>
           <p:cNvSpPr txBox="1"/>
           <p:nvPr/>
         </p:nvSpPr>
         <p:spPr>
           <a:xfrm>
-            <a:off x="457200" y="914400"/>
-            <a:ext cx="8229600" cy="457200"/>
+            <a:off x="1371600" y="2194560"/>
+            <a:ext cx="1645920" cy="137160"/>
           </a:xfrm>
           <a:prstGeom prst="rect">
             <a:avLst/>
@@ -3413,43 +4008,855 @@
           </a:bodyPr>
           <a:lstStyle/>
           <a:p>
-            <a:pPr algn="ctr">
-              <a:defRPr sz="2000" i="1">
-                <a:solidFill>
-                  <a:srgbClr val="646464"/>
-                </a:solidFill>
-              </a:defRPr>
-            </a:pPr>
-            <a:r>
-              <a:t>ROS executing inside WASM Runtime on Kubernetes</a:t>
-            </a:r>
-          </a:p>
-        </p:txBody>
-      </p:sp>
-      <p:pic>
-        <p:nvPicPr>
-          <p:cNvPr id="4" name="Picture 3" descr="architecture_complete.png"/>
-          <p:cNvPicPr>
-            <a:picLocks noChangeAspect="1"/>
-          </p:cNvPicPr>
+            <a:pPr>
+              <a:defRPr sz="900" b="1"/>
+            </a:pPr>
+            <a:r>
+              <a:t>generateMessage()</a:t>
+            </a:r>
+          </a:p>
+        </p:txBody>
+      </p:sp>
+      <p:cxnSp>
+        <p:nvCxnSpPr>
+          <p:cNvPr id="17" name="Connector 16"/>
+          <p:cNvCxnSpPr/>
           <p:nvPr/>
-        </p:nvPicPr>
-        <p:blipFill>
-          <a:blip r:embed="rId2"/>
-          <a:stretch>
-            <a:fillRect/>
-          </a:stretch>
-        </p:blipFill>
-        <p:spPr>
-          <a:xfrm>
-            <a:off x="457200" y="1463040"/>
-            <a:ext cx="8229600" cy="5303520"/>
+        </p:nvCxnSpPr>
+        <p:spPr>
+          <a:xfrm>
+            <a:off x="1097280" y="2606040"/>
+            <a:ext cx="2103120" cy="0"/>
+          </a:xfrm>
+          <a:prstGeom prst="line">
+            <a:avLst/>
+          </a:prstGeom>
+          <a:ln w="19050">
+            <a:solidFill>
+              <a:srgbClr val="4CAF50"/>
+            </a:solidFill>
+          </a:ln>
+        </p:spPr>
+        <p:style>
+          <a:lnRef idx="2">
+            <a:schemeClr val="accent1"/>
+          </a:lnRef>
+          <a:fillRef idx="0">
+            <a:schemeClr val="accent1"/>
+          </a:fillRef>
+          <a:effectRef idx="1">
+            <a:schemeClr val="accent1"/>
+          </a:effectRef>
+          <a:fontRef idx="minor">
+            <a:schemeClr val="tx1"/>
+          </a:fontRef>
+        </p:style>
+      </p:cxnSp>
+      <p:sp>
+        <p:nvSpPr>
+          <p:cNvPr id="18" name="TextBox 17"/>
+          <p:cNvSpPr txBox="1"/>
+          <p:nvPr/>
+        </p:nvSpPr>
+        <p:spPr>
+          <a:xfrm>
+            <a:off x="1371600" y="2514600"/>
+            <a:ext cx="1645920" cy="137160"/>
           </a:xfrm>
           <a:prstGeom prst="rect">
             <a:avLst/>
           </a:prstGeom>
-        </p:spPr>
-      </p:pic>
+          <a:noFill/>
+        </p:spPr>
+        <p:txBody>
+          <a:bodyPr wrap="none">
+            <a:spAutoFit/>
+          </a:bodyPr>
+          <a:lstStyle/>
+          <a:p>
+            <a:pPr>
+              <a:defRPr sz="900" b="1"/>
+            </a:pPr>
+            <a:r>
+              <a:t>publish(topic, message)</a:t>
+            </a:r>
+          </a:p>
+        </p:txBody>
+      </p:sp>
+      <p:cxnSp>
+        <p:nvCxnSpPr>
+          <p:cNvPr id="19" name="Connector 18"/>
+          <p:cNvCxnSpPr/>
+          <p:nvPr/>
+        </p:nvCxnSpPr>
+        <p:spPr>
+          <a:xfrm>
+            <a:off x="1097280" y="2926080"/>
+            <a:ext cx="2103120" cy="0"/>
+          </a:xfrm>
+          <a:prstGeom prst="line">
+            <a:avLst/>
+          </a:prstGeom>
+          <a:ln w="19050">
+            <a:solidFill>
+              <a:srgbClr val="FFC107"/>
+            </a:solidFill>
+          </a:ln>
+        </p:spPr>
+        <p:style>
+          <a:lnRef idx="2">
+            <a:schemeClr val="accent1"/>
+          </a:lnRef>
+          <a:fillRef idx="0">
+            <a:schemeClr val="accent1"/>
+          </a:fillRef>
+          <a:effectRef idx="1">
+            <a:schemeClr val="accent1"/>
+          </a:effectRef>
+          <a:fontRef idx="minor">
+            <a:schemeClr val="tx1"/>
+          </a:fontRef>
+        </p:style>
+      </p:cxnSp>
+      <p:sp>
+        <p:nvSpPr>
+          <p:cNvPr id="20" name="TextBox 19"/>
+          <p:cNvSpPr txBox="1"/>
+          <p:nvPr/>
+        </p:nvSpPr>
+        <p:spPr>
+          <a:xfrm>
+            <a:off x="1371600" y="2834640"/>
+            <a:ext cx="1645920" cy="137160"/>
+          </a:xfrm>
+          <a:prstGeom prst="rect">
+            <a:avLst/>
+          </a:prstGeom>
+          <a:noFill/>
+        </p:spPr>
+        <p:txBody>
+          <a:bodyPr wrap="none">
+            <a:spAutoFit/>
+          </a:bodyPr>
+          <a:lstStyle/>
+          <a:p>
+            <a:pPr>
+              <a:defRPr sz="900" b="1"/>
+            </a:pPr>
+            <a:r>
+              <a:t>ROS2 DDS publish</a:t>
+            </a:r>
+          </a:p>
+        </p:txBody>
+      </p:sp>
+      <p:cxnSp>
+        <p:nvCxnSpPr>
+          <p:cNvPr id="21" name="Connector 20"/>
+          <p:cNvCxnSpPr/>
+          <p:nvPr/>
+        </p:nvCxnSpPr>
+        <p:spPr>
+          <a:xfrm flipH="1">
+            <a:off x="1097280" y="3246120"/>
+            <a:ext cx="2103120" cy="0"/>
+          </a:xfrm>
+          <a:prstGeom prst="line">
+            <a:avLst/>
+          </a:prstGeom>
+          <a:ln w="19050">
+            <a:solidFill>
+              <a:srgbClr val="9C27B0"/>
+            </a:solidFill>
+          </a:ln>
+        </p:spPr>
+        <p:style>
+          <a:lnRef idx="2">
+            <a:schemeClr val="accent1"/>
+          </a:lnRef>
+          <a:fillRef idx="0">
+            <a:schemeClr val="accent1"/>
+          </a:fillRef>
+          <a:effectRef idx="1">
+            <a:schemeClr val="accent1"/>
+          </a:effectRef>
+          <a:fontRef idx="minor">
+            <a:schemeClr val="tx1"/>
+          </a:fontRef>
+        </p:style>
+      </p:cxnSp>
+      <p:sp>
+        <p:nvSpPr>
+          <p:cNvPr id="22" name="TextBox 21"/>
+          <p:cNvSpPr txBox="1"/>
+          <p:nvPr/>
+        </p:nvSpPr>
+        <p:spPr>
+          <a:xfrm>
+            <a:off x="1371600" y="3154679"/>
+            <a:ext cx="1645920" cy="137160"/>
+          </a:xfrm>
+          <a:prstGeom prst="rect">
+            <a:avLst/>
+          </a:prstGeom>
+          <a:noFill/>
+        </p:spPr>
+        <p:txBody>
+          <a:bodyPr wrap="none">
+            <a:spAutoFit/>
+          </a:bodyPr>
+          <a:lstStyle/>
+          <a:p>
+            <a:pPr>
+              <a:defRPr sz="900" b="1"/>
+            </a:pPr>
+            <a:r>
+              <a:t>message delivery</a:t>
+            </a:r>
+          </a:p>
+        </p:txBody>
+      </p:sp>
+      <p:cxnSp>
+        <p:nvCxnSpPr>
+          <p:cNvPr id="23" name="Connector 22"/>
+          <p:cNvCxnSpPr/>
+          <p:nvPr/>
+        </p:nvCxnSpPr>
+        <p:spPr>
+          <a:xfrm>
+            <a:off x="1097280" y="3566160"/>
+            <a:ext cx="2103120" cy="0"/>
+          </a:xfrm>
+          <a:prstGeom prst="line">
+            <a:avLst/>
+          </a:prstGeom>
+          <a:ln w="19050">
+            <a:solidFill>
+              <a:srgbClr val="4CAF50"/>
+            </a:solidFill>
+          </a:ln>
+        </p:spPr>
+        <p:style>
+          <a:lnRef idx="2">
+            <a:schemeClr val="accent1"/>
+          </a:lnRef>
+          <a:fillRef idx="0">
+            <a:schemeClr val="accent1"/>
+          </a:fillRef>
+          <a:effectRef idx="1">
+            <a:schemeClr val="accent1"/>
+          </a:effectRef>
+          <a:fontRef idx="minor">
+            <a:schemeClr val="tx1"/>
+          </a:fontRef>
+        </p:style>
+      </p:cxnSp>
+      <p:sp>
+        <p:nvSpPr>
+          <p:cNvPr id="24" name="TextBox 23"/>
+          <p:cNvSpPr txBox="1"/>
+          <p:nvPr/>
+        </p:nvSpPr>
+        <p:spPr>
+          <a:xfrm>
+            <a:off x="1371600" y="3474720"/>
+            <a:ext cx="1645920" cy="137160"/>
+          </a:xfrm>
+          <a:prstGeom prst="rect">
+            <a:avLst/>
+          </a:prstGeom>
+          <a:noFill/>
+        </p:spPr>
+        <p:txBody>
+          <a:bodyPr wrap="none">
+            <a:spAutoFit/>
+          </a:bodyPr>
+          <a:lstStyle/>
+          <a:p>
+            <a:pPr>
+              <a:defRPr sz="900" b="1"/>
+            </a:pPr>
+            <a:r>
+              <a:t>message callback</a:t>
+            </a:r>
+          </a:p>
+        </p:txBody>
+      </p:sp>
+      <p:cxnSp>
+        <p:nvCxnSpPr>
+          <p:cNvPr id="25" name="Connector 24"/>
+          <p:cNvCxnSpPr/>
+          <p:nvPr/>
+        </p:nvCxnSpPr>
+        <p:spPr>
+          <a:xfrm>
+            <a:off x="1097280" y="3886200"/>
+            <a:ext cx="2103120" cy="0"/>
+          </a:xfrm>
+          <a:prstGeom prst="line">
+            <a:avLst/>
+          </a:prstGeom>
+          <a:ln w="19050">
+            <a:solidFill>
+              <a:srgbClr val="F5576C"/>
+            </a:solidFill>
+          </a:ln>
+        </p:spPr>
+        <p:style>
+          <a:lnRef idx="2">
+            <a:schemeClr val="accent1"/>
+          </a:lnRef>
+          <a:fillRef idx="0">
+            <a:schemeClr val="accent1"/>
+          </a:fillRef>
+          <a:effectRef idx="1">
+            <a:schemeClr val="accent1"/>
+          </a:effectRef>
+          <a:fontRef idx="minor">
+            <a:schemeClr val="tx1"/>
+          </a:fontRef>
+        </p:style>
+      </p:cxnSp>
+      <p:sp>
+        <p:nvSpPr>
+          <p:cNvPr id="26" name="TextBox 25"/>
+          <p:cNvSpPr txBox="1"/>
+          <p:nvPr/>
+        </p:nvSpPr>
+        <p:spPr>
+          <a:xfrm>
+            <a:off x="1371600" y="3794760"/>
+            <a:ext cx="1645920" cy="137160"/>
+          </a:xfrm>
+          <a:prstGeom prst="rect">
+            <a:avLst/>
+          </a:prstGeom>
+          <a:noFill/>
+        </p:spPr>
+        <p:txBody>
+          <a:bodyPr wrap="none">
+            <a:spAutoFit/>
+          </a:bodyPr>
+          <a:lstStyle/>
+          <a:p>
+            <a:pPr>
+              <a:defRPr sz="900" b="1"/>
+            </a:pPr>
+            <a:r>
+              <a:t>processMessage(data)</a:t>
+            </a:r>
+          </a:p>
+        </p:txBody>
+      </p:sp>
+      <p:sp>
+        <p:nvSpPr>
+          <p:cNvPr id="27" name="TextBox 26"/>
+          <p:cNvSpPr txBox="1"/>
+          <p:nvPr/>
+        </p:nvSpPr>
+        <p:spPr>
+          <a:xfrm>
+            <a:off x="3291840" y="2011680"/>
+            <a:ext cx="1097280" cy="274320"/>
+          </a:xfrm>
+          <a:prstGeom prst="rect">
+            <a:avLst/>
+          </a:prstGeom>
+          <a:noFill/>
+        </p:spPr>
+        <p:txBody>
+          <a:bodyPr wrap="none">
+            <a:spAutoFit/>
+          </a:bodyPr>
+          <a:lstStyle/>
+          <a:p>
+            <a:pPr>
+              <a:defRPr sz="800" i="1">
+                <a:solidFill>
+                  <a:srgbClr val="808080"/>
+                </a:solidFill>
+              </a:defRPr>
+            </a:pPr>
+            <a:r>
+              <a:t>Loop: Every second</a:t>
+            </a:r>
+          </a:p>
+        </p:txBody>
+      </p:sp>
+      <p:sp>
+        <p:nvSpPr>
+          <p:cNvPr id="28" name="Rectangle 27"/>
+          <p:cNvSpPr/>
+          <p:nvPr/>
+        </p:nvSpPr>
+        <p:spPr>
+          <a:xfrm>
+            <a:off x="5029200" y="1828800"/>
+            <a:ext cx="3657600" cy="2743200"/>
+          </a:xfrm>
+          <a:prstGeom prst="rect">
+            <a:avLst/>
+          </a:prstGeom>
+          <a:solidFill>
+            <a:srgbClr val="F0F0F0"/>
+          </a:solidFill>
+          <a:ln w="25400">
+            <a:solidFill>
+              <a:srgbClr val="000000"/>
+            </a:solidFill>
+          </a:ln>
+        </p:spPr>
+        <p:style>
+          <a:lnRef idx="1">
+            <a:schemeClr val="accent1"/>
+          </a:lnRef>
+          <a:fillRef idx="3">
+            <a:schemeClr val="accent1"/>
+          </a:fillRef>
+          <a:effectRef idx="2">
+            <a:schemeClr val="accent1"/>
+          </a:effectRef>
+          <a:fontRef idx="minor">
+            <a:schemeClr val="lt1"/>
+          </a:fontRef>
+        </p:style>
+        <p:txBody>
+          <a:bodyPr rtlCol="0" anchor="ctr"/>
+          <a:lstStyle/>
+          <a:p>
+            <a:pPr algn="ctr">
+              <a:defRPr sz="1000" b="1">
+                <a:solidFill>
+                  <a:srgbClr val="000000"/>
+                </a:solidFill>
+              </a:defRPr>
+            </a:pPr>
+            <a:r>
+              <a:t>Kubernetes Cluster</a:t>
+            </a:r>
+          </a:p>
+        </p:txBody>
+      </p:sp>
+      <p:sp>
+        <p:nvSpPr>
+          <p:cNvPr id="29" name="Rectangle 28"/>
+          <p:cNvSpPr/>
+          <p:nvPr/>
+        </p:nvSpPr>
+        <p:spPr>
+          <a:xfrm>
+            <a:off x="5303520" y="2286000"/>
+            <a:ext cx="1463040" cy="914400"/>
+          </a:xfrm>
+          <a:prstGeom prst="rect">
+            <a:avLst/>
+          </a:prstGeom>
+          <a:solidFill>
+            <a:srgbClr val="C8DCFF"/>
+          </a:solidFill>
+          <a:ln w="12700">
+            <a:solidFill>
+              <a:srgbClr val="000000"/>
+            </a:solidFill>
+          </a:ln>
+        </p:spPr>
+        <p:style>
+          <a:lnRef idx="1">
+            <a:schemeClr val="accent1"/>
+          </a:lnRef>
+          <a:fillRef idx="3">
+            <a:schemeClr val="accent1"/>
+          </a:fillRef>
+          <a:effectRef idx="2">
+            <a:schemeClr val="accent1"/>
+          </a:effectRef>
+          <a:fontRef idx="minor">
+            <a:schemeClr val="lt1"/>
+          </a:fontRef>
+        </p:style>
+        <p:txBody>
+          <a:bodyPr rtlCol="0" anchor="ctr"/>
+          <a:lstStyle/>
+          <a:p>
+            <a:pPr algn="ctr">
+              <a:defRPr sz="1000" b="1">
+                <a:solidFill>
+                  <a:srgbClr val="000000"/>
+                </a:solidFill>
+              </a:defRPr>
+            </a:pPr>
+            <a:r>
+              <a:t>K8s Pod 1</a:t>
+            </a:r>
+          </a:p>
+        </p:txBody>
+      </p:sp>
+      <p:sp>
+        <p:nvSpPr>
+          <p:cNvPr id="30" name="Rectangle 29"/>
+          <p:cNvSpPr/>
+          <p:nvPr/>
+        </p:nvSpPr>
+        <p:spPr>
+          <a:xfrm>
+            <a:off x="5486400" y="2560320"/>
+            <a:ext cx="1097280" cy="320040"/>
+          </a:xfrm>
+          <a:prstGeom prst="rect">
+            <a:avLst/>
+          </a:prstGeom>
+          <a:solidFill>
+            <a:srgbClr val="667EEA"/>
+          </a:solidFill>
+          <a:ln w="12700">
+            <a:solidFill>
+              <a:srgbClr val="000000"/>
+            </a:solidFill>
+          </a:ln>
+        </p:spPr>
+        <p:style>
+          <a:lnRef idx="1">
+            <a:schemeClr val="accent1"/>
+          </a:lnRef>
+          <a:fillRef idx="3">
+            <a:schemeClr val="accent1"/>
+          </a:fillRef>
+          <a:effectRef idx="2">
+            <a:schemeClr val="accent1"/>
+          </a:effectRef>
+          <a:fontRef idx="minor">
+            <a:schemeClr val="lt1"/>
+          </a:fontRef>
+        </p:style>
+        <p:txBody>
+          <a:bodyPr rtlCol="0" anchor="ctr"/>
+          <a:lstStyle/>
+          <a:p>
+            <a:pPr algn="ctr">
+              <a:defRPr sz="1000" b="1">
+                <a:solidFill>
+                  <a:srgbClr val="FFFFFF"/>
+                </a:solidFill>
+              </a:defRPr>
+            </a:pPr>
+            <a:r>
+              <a:t>WASM Runtime</a:t>
+            </a:r>
+          </a:p>
+        </p:txBody>
+      </p:sp>
+      <p:sp>
+        <p:nvSpPr>
+          <p:cNvPr id="31" name="Rectangle 30"/>
+          <p:cNvSpPr/>
+          <p:nvPr/>
+        </p:nvSpPr>
+        <p:spPr>
+          <a:xfrm>
+            <a:off x="5486400" y="2926080"/>
+            <a:ext cx="1097280" cy="320040"/>
+          </a:xfrm>
+          <a:prstGeom prst="rect">
+            <a:avLst/>
+          </a:prstGeom>
+          <a:solidFill>
+            <a:srgbClr val="4CAF50"/>
+          </a:solidFill>
+          <a:ln w="12700">
+            <a:solidFill>
+              <a:srgbClr val="000000"/>
+            </a:solidFill>
+          </a:ln>
+        </p:spPr>
+        <p:style>
+          <a:lnRef idx="1">
+            <a:schemeClr val="accent1"/>
+          </a:lnRef>
+          <a:fillRef idx="3">
+            <a:schemeClr val="accent1"/>
+          </a:fillRef>
+          <a:effectRef idx="2">
+            <a:schemeClr val="accent1"/>
+          </a:effectRef>
+          <a:fontRef idx="minor">
+            <a:schemeClr val="lt1"/>
+          </a:fontRef>
+        </p:style>
+        <p:txBody>
+          <a:bodyPr rtlCol="0" anchor="ctr"/>
+          <a:lstStyle/>
+          <a:p>
+            <a:pPr algn="ctr">
+              <a:defRPr sz="1000" b="1">
+                <a:solidFill>
+                  <a:srgbClr val="FFFFFF"/>
+                </a:solidFill>
+              </a:defRPr>
+            </a:pPr>
+            <a:r>
+              <a:t>microROS Node A</a:t>
+            </a:r>
+          </a:p>
+        </p:txBody>
+      </p:sp>
+      <p:sp>
+        <p:nvSpPr>
+          <p:cNvPr id="32" name="Rectangle 31"/>
+          <p:cNvSpPr/>
+          <p:nvPr/>
+        </p:nvSpPr>
+        <p:spPr>
+          <a:xfrm>
+            <a:off x="6949440" y="2286000"/>
+            <a:ext cx="1463040" cy="914400"/>
+          </a:xfrm>
+          <a:prstGeom prst="rect">
+            <a:avLst/>
+          </a:prstGeom>
+          <a:solidFill>
+            <a:srgbClr val="C8DCFF"/>
+          </a:solidFill>
+          <a:ln w="12700">
+            <a:solidFill>
+              <a:srgbClr val="000000"/>
+            </a:solidFill>
+          </a:ln>
+        </p:spPr>
+        <p:style>
+          <a:lnRef idx="1">
+            <a:schemeClr val="accent1"/>
+          </a:lnRef>
+          <a:fillRef idx="3">
+            <a:schemeClr val="accent1"/>
+          </a:fillRef>
+          <a:effectRef idx="2">
+            <a:schemeClr val="accent1"/>
+          </a:effectRef>
+          <a:fontRef idx="minor">
+            <a:schemeClr val="lt1"/>
+          </a:fontRef>
+        </p:style>
+        <p:txBody>
+          <a:bodyPr rtlCol="0" anchor="ctr"/>
+          <a:lstStyle/>
+          <a:p>
+            <a:pPr algn="ctr">
+              <a:defRPr sz="1000" b="1">
+                <a:solidFill>
+                  <a:srgbClr val="000000"/>
+                </a:solidFill>
+              </a:defRPr>
+            </a:pPr>
+            <a:r>
+              <a:t>K8s Pod 2</a:t>
+            </a:r>
+          </a:p>
+        </p:txBody>
+      </p:sp>
+      <p:sp>
+        <p:nvSpPr>
+          <p:cNvPr id="33" name="Rectangle 32"/>
+          <p:cNvSpPr/>
+          <p:nvPr/>
+        </p:nvSpPr>
+        <p:spPr>
+          <a:xfrm>
+            <a:off x="7132320" y="2560320"/>
+            <a:ext cx="1097280" cy="320040"/>
+          </a:xfrm>
+          <a:prstGeom prst="rect">
+            <a:avLst/>
+          </a:prstGeom>
+          <a:solidFill>
+            <a:srgbClr val="667EEA"/>
+          </a:solidFill>
+          <a:ln w="12700">
+            <a:solidFill>
+              <a:srgbClr val="000000"/>
+            </a:solidFill>
+          </a:ln>
+        </p:spPr>
+        <p:style>
+          <a:lnRef idx="1">
+            <a:schemeClr val="accent1"/>
+          </a:lnRef>
+          <a:fillRef idx="3">
+            <a:schemeClr val="accent1"/>
+          </a:fillRef>
+          <a:effectRef idx="2">
+            <a:schemeClr val="accent1"/>
+          </a:effectRef>
+          <a:fontRef idx="minor">
+            <a:schemeClr val="lt1"/>
+          </a:fontRef>
+        </p:style>
+        <p:txBody>
+          <a:bodyPr rtlCol="0" anchor="ctr"/>
+          <a:lstStyle/>
+          <a:p>
+            <a:pPr algn="ctr">
+              <a:defRPr sz="1000" b="1">
+                <a:solidFill>
+                  <a:srgbClr val="FFFFFF"/>
+                </a:solidFill>
+              </a:defRPr>
+            </a:pPr>
+            <a:r>
+              <a:t>WASM Runtime</a:t>
+            </a:r>
+          </a:p>
+        </p:txBody>
+      </p:sp>
+      <p:sp>
+        <p:nvSpPr>
+          <p:cNvPr id="34" name="Rectangle 33"/>
+          <p:cNvSpPr/>
+          <p:nvPr/>
+        </p:nvSpPr>
+        <p:spPr>
+          <a:xfrm>
+            <a:off x="7132320" y="2926080"/>
+            <a:ext cx="1097280" cy="320040"/>
+          </a:xfrm>
+          <a:prstGeom prst="rect">
+            <a:avLst/>
+          </a:prstGeom>
+          <a:solidFill>
+            <a:srgbClr val="4CAF50"/>
+          </a:solidFill>
+          <a:ln w="12700">
+            <a:solidFill>
+              <a:srgbClr val="000000"/>
+            </a:solidFill>
+          </a:ln>
+        </p:spPr>
+        <p:style>
+          <a:lnRef idx="1">
+            <a:schemeClr val="accent1"/>
+          </a:lnRef>
+          <a:fillRef idx="3">
+            <a:schemeClr val="accent1"/>
+          </a:fillRef>
+          <a:effectRef idx="2">
+            <a:schemeClr val="accent1"/>
+          </a:effectRef>
+          <a:fontRef idx="minor">
+            <a:schemeClr val="lt1"/>
+          </a:fontRef>
+        </p:style>
+        <p:txBody>
+          <a:bodyPr rtlCol="0" anchor="ctr"/>
+          <a:lstStyle/>
+          <a:p>
+            <a:pPr algn="ctr">
+              <a:defRPr sz="1000" b="1">
+                <a:solidFill>
+                  <a:srgbClr val="FFFFFF"/>
+                </a:solidFill>
+              </a:defRPr>
+            </a:pPr>
+            <a:r>
+              <a:t>microROS Node B</a:t>
+            </a:r>
+          </a:p>
+        </p:txBody>
+      </p:sp>
+      <p:cxnSp>
+        <p:nvCxnSpPr>
+          <p:cNvPr id="35" name="Connector 34"/>
+          <p:cNvCxnSpPr/>
+          <p:nvPr/>
+        </p:nvCxnSpPr>
+        <p:spPr>
+          <a:xfrm>
+            <a:off x="6766560" y="3108960"/>
+            <a:ext cx="182880" cy="0"/>
+          </a:xfrm>
+          <a:prstGeom prst="line">
+            <a:avLst/>
+          </a:prstGeom>
+          <a:ln w="19050">
+            <a:solidFill>
+              <a:srgbClr val="000000"/>
+            </a:solidFill>
+          </a:ln>
+        </p:spPr>
+        <p:style>
+          <a:lnRef idx="2">
+            <a:schemeClr val="accent1"/>
+          </a:lnRef>
+          <a:fillRef idx="0">
+            <a:schemeClr val="accent1"/>
+          </a:fillRef>
+          <a:effectRef idx="1">
+            <a:schemeClr val="accent1"/>
+          </a:effectRef>
+          <a:fontRef idx="minor">
+            <a:schemeClr val="tx1"/>
+          </a:fontRef>
+        </p:style>
+      </p:cxnSp>
+      <p:sp>
+        <p:nvSpPr>
+          <p:cNvPr id="36" name="TextBox 35"/>
+          <p:cNvSpPr txBox="1"/>
+          <p:nvPr/>
+        </p:nvSpPr>
+        <p:spPr>
+          <a:xfrm>
+            <a:off x="6400800" y="3200400"/>
+            <a:ext cx="914400" cy="182880"/>
+          </a:xfrm>
+          <a:prstGeom prst="rect">
+            <a:avLst/>
+          </a:prstGeom>
+          <a:noFill/>
+        </p:spPr>
+        <p:txBody>
+          <a:bodyPr wrap="none">
+            <a:spAutoFit/>
+          </a:bodyPr>
+          <a:lstStyle/>
+          <a:p>
+            <a:pPr>
+              <a:defRPr sz="800" b="1"/>
+            </a:pPr>
+            <a:r>
+              <a:t>ROS Topics/Services</a:t>
+            </a:r>
+          </a:p>
+        </p:txBody>
+      </p:sp>
+      <p:sp>
+        <p:nvSpPr>
+          <p:cNvPr id="37" name="TextBox 36"/>
+          <p:cNvSpPr txBox="1"/>
+          <p:nvPr/>
+        </p:nvSpPr>
+        <p:spPr>
+          <a:xfrm>
+            <a:off x="5303520" y="3657600"/>
+            <a:ext cx="3291840" cy="731520"/>
+          </a:xfrm>
+          <a:prstGeom prst="rect">
+            <a:avLst/>
+          </a:prstGeom>
+          <a:noFill/>
+        </p:spPr>
+        <p:txBody>
+          <a:bodyPr wrap="square">
+            <a:spAutoFit/>
+          </a:bodyPr>
+          <a:lstStyle/>
+          <a:p>
+            <a:pPr>
+              <a:defRPr sz="1000" b="1"/>
+            </a:pPr>
+            <a:r>
+              <a:t>K8s manages: Deployment • Scaling • Health Checks • Updates</a:t>
+            </a:r>
+          </a:p>
+        </p:txBody>
+      </p:sp>
     </p:spTree>
   </p:cSld>
   <p:clrMapOvr>
@@ -3476,419 +4883,6 @@
         </p:nvSpPr>
         <p:spPr>
           <a:xfrm>
-            <a:off x="457200" y="274320"/>
-            <a:ext cx="8229600" cy="731520"/>
-          </a:xfrm>
-          <a:prstGeom prst="rect">
-            <a:avLst/>
-          </a:prstGeom>
-          <a:noFill/>
-        </p:spPr>
-        <p:txBody>
-          <a:bodyPr wrap="none">
-            <a:spAutoFit/>
-          </a:bodyPr>
-          <a:lstStyle/>
-          <a:p>
-            <a:pPr algn="ctr">
-              <a:defRPr sz="4000" b="1">
-                <a:solidFill>
-                  <a:srgbClr val="003366"/>
-                </a:solidFill>
-              </a:defRPr>
-            </a:pPr>
-            <a:r>
-              <a:t>System Workflow</a:t>
-            </a:r>
-          </a:p>
-        </p:txBody>
-      </p:sp>
-      <p:sp>
-        <p:nvSpPr>
-          <p:cNvPr id="3" name="TextBox 2"/>
-          <p:cNvSpPr txBox="1"/>
-          <p:nvPr/>
-        </p:nvSpPr>
-        <p:spPr>
-          <a:xfrm>
-            <a:off x="457200" y="914400"/>
-            <a:ext cx="8229600" cy="457200"/>
-          </a:xfrm>
-          <a:prstGeom prst="rect">
-            <a:avLst/>
-          </a:prstGeom>
-          <a:noFill/>
-        </p:spPr>
-        <p:txBody>
-          <a:bodyPr wrap="none">
-            <a:spAutoFit/>
-          </a:bodyPr>
-          <a:lstStyle/>
-          <a:p>
-            <a:pPr algn="ctr">
-              <a:defRPr sz="1800" i="1">
-                <a:solidFill>
-                  <a:srgbClr val="646464"/>
-                </a:solidFill>
-              </a:defRPr>
-            </a:pPr>
-            <a:r>
-              <a:t>Complete workflow: ROS executes inside WASM from deployment to message processing</a:t>
-            </a:r>
-          </a:p>
-        </p:txBody>
-      </p:sp>
-      <p:pic>
-        <p:nvPicPr>
-          <p:cNvPr id="4" name="Picture 3" descr="workflow.png"/>
-          <p:cNvPicPr>
-            <a:picLocks noChangeAspect="1"/>
-          </p:cNvPicPr>
-          <p:nvPr/>
-        </p:nvPicPr>
-        <p:blipFill>
-          <a:blip r:embed="rId2"/>
-          <a:stretch>
-            <a:fillRect/>
-          </a:stretch>
-        </p:blipFill>
-        <p:spPr>
-          <a:xfrm>
-            <a:off x="457200" y="1463040"/>
-            <a:ext cx="8229600" cy="5303520"/>
-          </a:xfrm>
-          <a:prstGeom prst="rect">
-            <a:avLst/>
-          </a:prstGeom>
-        </p:spPr>
-      </p:pic>
-    </p:spTree>
-  </p:cSld>
-  <p:clrMapOvr>
-    <a:masterClrMapping/>
-  </p:clrMapOvr>
-</p:sld>
-</file>
-
-<file path=ppt/slides/slide4.xml><?xml version="1.0" encoding="utf-8"?>
-<p:sld xmlns:a="http://schemas.openxmlformats.org/drawingml/2006/main" xmlns:p="http://schemas.openxmlformats.org/presentationml/2006/main" xmlns:r="http://schemas.openxmlformats.org/officeDocument/2006/relationships">
-  <p:cSld>
-    <p:spTree>
-      <p:nvGrpSpPr>
-        <p:cNvPr id="1" name=""/>
-        <p:cNvGrpSpPr/>
-        <p:nvPr/>
-      </p:nvGrpSpPr>
-      <p:grpSpPr/>
-      <p:sp>
-        <p:nvSpPr>
-          <p:cNvPr id="2" name="TextBox 1"/>
-          <p:cNvSpPr txBox="1"/>
-          <p:nvPr/>
-        </p:nvSpPr>
-        <p:spPr>
-          <a:xfrm>
-            <a:off x="457200" y="274320"/>
-            <a:ext cx="8229600" cy="731520"/>
-          </a:xfrm>
-          <a:prstGeom prst="rect">
-            <a:avLst/>
-          </a:prstGeom>
-          <a:noFill/>
-        </p:spPr>
-        <p:txBody>
-          <a:bodyPr wrap="none">
-            <a:spAutoFit/>
-          </a:bodyPr>
-          <a:lstStyle/>
-          <a:p>
-            <a:pPr algn="ctr">
-              <a:defRPr sz="4000" b="1">
-                <a:solidFill>
-                  <a:srgbClr val="003366"/>
-                </a:solidFill>
-              </a:defRPr>
-            </a:pPr>
-            <a:r>
-              <a:t>Communication Sequence</a:t>
-            </a:r>
-          </a:p>
-        </p:txBody>
-      </p:sp>
-      <p:sp>
-        <p:nvSpPr>
-          <p:cNvPr id="3" name="TextBox 2"/>
-          <p:cNvSpPr txBox="1"/>
-          <p:nvPr/>
-        </p:nvSpPr>
-        <p:spPr>
-          <a:xfrm>
-            <a:off x="457200" y="914400"/>
-            <a:ext cx="8229600" cy="457200"/>
-          </a:xfrm>
-          <a:prstGeom prst="rect">
-            <a:avLst/>
-          </a:prstGeom>
-          <a:noFill/>
-        </p:spPr>
-        <p:txBody>
-          <a:bodyPr wrap="none">
-            <a:spAutoFit/>
-          </a:bodyPr>
-          <a:lstStyle/>
-          <a:p>
-            <a:pPr algn="ctr">
-              <a:defRPr sz="1800" i="1">
-                <a:solidFill>
-                  <a:srgbClr val="646464"/>
-                </a:solidFill>
-              </a:defRPr>
-            </a:pPr>
-            <a:r>
-              <a:t>ROS operations execute inside WASM runtime</a:t>
-            </a:r>
-          </a:p>
-        </p:txBody>
-      </p:sp>
-      <p:pic>
-        <p:nvPicPr>
-          <p:cNvPr id="4" name="Picture 3" descr="sequence.png"/>
-          <p:cNvPicPr>
-            <a:picLocks noChangeAspect="1"/>
-          </p:cNvPicPr>
-          <p:nvPr/>
-        </p:nvPicPr>
-        <p:blipFill>
-          <a:blip r:embed="rId2"/>
-          <a:stretch>
-            <a:fillRect/>
-          </a:stretch>
-        </p:blipFill>
-        <p:spPr>
-          <a:xfrm>
-            <a:off x="457200" y="1463040"/>
-            <a:ext cx="8229600" cy="5303520"/>
-          </a:xfrm>
-          <a:prstGeom prst="rect">
-            <a:avLst/>
-          </a:prstGeom>
-        </p:spPr>
-      </p:pic>
-    </p:spTree>
-  </p:cSld>
-  <p:clrMapOvr>
-    <a:masterClrMapping/>
-  </p:clrMapOvr>
-</p:sld>
-</file>
-
-<file path=ppt/slides/slide5.xml><?xml version="1.0" encoding="utf-8"?>
-<p:sld xmlns:a="http://schemas.openxmlformats.org/drawingml/2006/main" xmlns:p="http://schemas.openxmlformats.org/presentationml/2006/main" xmlns:r="http://schemas.openxmlformats.org/officeDocument/2006/relationships">
-  <p:cSld>
-    <p:spTree>
-      <p:nvGrpSpPr>
-        <p:cNvPr id="1" name=""/>
-        <p:cNvGrpSpPr/>
-        <p:nvPr/>
-      </p:nvGrpSpPr>
-      <p:grpSpPr/>
-      <p:sp>
-        <p:nvSpPr>
-          <p:cNvPr id="2" name="TextBox 1"/>
-          <p:cNvSpPr txBox="1"/>
-          <p:nvPr/>
-        </p:nvSpPr>
-        <p:spPr>
-          <a:xfrm>
-            <a:off x="457200" y="274320"/>
-            <a:ext cx="8229600" cy="731520"/>
-          </a:xfrm>
-          <a:prstGeom prst="rect">
-            <a:avLst/>
-          </a:prstGeom>
-          <a:noFill/>
-        </p:spPr>
-        <p:txBody>
-          <a:bodyPr wrap="none">
-            <a:spAutoFit/>
-          </a:bodyPr>
-          <a:lstStyle/>
-          <a:p>
-            <a:pPr algn="ctr">
-              <a:defRPr sz="3600" b="1">
-                <a:solidFill>
-                  <a:srgbClr val="003366"/>
-                </a:solidFill>
-              </a:defRPr>
-            </a:pPr>
-            <a:r>
-              <a:t>Kubernetes Deployment Architecture</a:t>
-            </a:r>
-          </a:p>
-        </p:txBody>
-      </p:sp>
-      <p:pic>
-        <p:nvPicPr>
-          <p:cNvPr id="3" name="Picture 2" descr="k8s_deployment.png"/>
-          <p:cNvPicPr>
-            <a:picLocks noChangeAspect="1"/>
-          </p:cNvPicPr>
-          <p:nvPr/>
-        </p:nvPicPr>
-        <p:blipFill>
-          <a:blip r:embed="rId2"/>
-          <a:stretch>
-            <a:fillRect/>
-          </a:stretch>
-        </p:blipFill>
-        <p:spPr>
-          <a:xfrm>
-            <a:off x="457200" y="1188720"/>
-            <a:ext cx="8229600" cy="5486400"/>
-          </a:xfrm>
-          <a:prstGeom prst="rect">
-            <a:avLst/>
-          </a:prstGeom>
-        </p:spPr>
-      </p:pic>
-    </p:spTree>
-  </p:cSld>
-  <p:clrMapOvr>
-    <a:masterClrMapping/>
-  </p:clrMapOvr>
-</p:sld>
-</file>
-
-<file path=ppt/slides/slide6.xml><?xml version="1.0" encoding="utf-8"?>
-<p:sld xmlns:a="http://schemas.openxmlformats.org/drawingml/2006/main" xmlns:p="http://schemas.openxmlformats.org/presentationml/2006/main" xmlns:r="http://schemas.openxmlformats.org/officeDocument/2006/relationships">
-  <p:cSld>
-    <p:spTree>
-      <p:nvGrpSpPr>
-        <p:cNvPr id="1" name=""/>
-        <p:cNvGrpSpPr/>
-        <p:nvPr/>
-      </p:nvGrpSpPr>
-      <p:grpSpPr/>
-      <p:sp>
-        <p:nvSpPr>
-          <p:cNvPr id="2" name="TextBox 1"/>
-          <p:cNvSpPr txBox="1"/>
-          <p:nvPr/>
-        </p:nvSpPr>
-        <p:spPr>
-          <a:xfrm>
-            <a:off x="457200" y="274320"/>
-            <a:ext cx="8229600" cy="731520"/>
-          </a:xfrm>
-          <a:prstGeom prst="rect">
-            <a:avLst/>
-          </a:prstGeom>
-          <a:noFill/>
-        </p:spPr>
-        <p:txBody>
-          <a:bodyPr wrap="none">
-            <a:spAutoFit/>
-          </a:bodyPr>
-          <a:lstStyle/>
-          <a:p>
-            <a:pPr algn="ctr">
-              <a:defRPr sz="4000" b="1">
-                <a:solidFill>
-                  <a:srgbClr val="003366"/>
-                </a:solidFill>
-              </a:defRPr>
-            </a:pPr>
-            <a:r>
-              <a:t>System Component Diagram</a:t>
-            </a:r>
-          </a:p>
-        </p:txBody>
-      </p:sp>
-      <p:sp>
-        <p:nvSpPr>
-          <p:cNvPr id="3" name="TextBox 2"/>
-          <p:cNvSpPr txBox="1"/>
-          <p:nvPr/>
-        </p:nvSpPr>
-        <p:spPr>
-          <a:xfrm>
-            <a:off x="457200" y="914400"/>
-            <a:ext cx="8229600" cy="457200"/>
-          </a:xfrm>
-          <a:prstGeom prst="rect">
-            <a:avLst/>
-          </a:prstGeom>
-          <a:noFill/>
-        </p:spPr>
-        <p:txBody>
-          <a:bodyPr wrap="none">
-            <a:spAutoFit/>
-          </a:bodyPr>
-          <a:lstStyle/>
-          <a:p>
-            <a:pPr algn="ctr">
-              <a:defRPr sz="1800" i="1">
-                <a:solidFill>
-                  <a:srgbClr val="646464"/>
-                </a:solidFill>
-              </a:defRPr>
-            </a:pPr>
-            <a:r>
-              <a:t>ROS components executing in WASM runtime</a:t>
-            </a:r>
-          </a:p>
-        </p:txBody>
-      </p:sp>
-      <p:pic>
-        <p:nvPicPr>
-          <p:cNvPr id="4" name="Picture 3" descr="component_diagram.png"/>
-          <p:cNvPicPr>
-            <a:picLocks noChangeAspect="1"/>
-          </p:cNvPicPr>
-          <p:nvPr/>
-        </p:nvPicPr>
-        <p:blipFill>
-          <a:blip r:embed="rId2"/>
-          <a:stretch>
-            <a:fillRect/>
-          </a:stretch>
-        </p:blipFill>
-        <p:spPr>
-          <a:xfrm>
-            <a:off x="457200" y="1463040"/>
-            <a:ext cx="8229600" cy="5303520"/>
-          </a:xfrm>
-          <a:prstGeom prst="rect">
-            <a:avLst/>
-          </a:prstGeom>
-        </p:spPr>
-      </p:pic>
-    </p:spTree>
-  </p:cSld>
-  <p:clrMapOvr>
-    <a:masterClrMapping/>
-  </p:clrMapOvr>
-</p:sld>
-</file>
-
-<file path=ppt/slides/slide7.xml><?xml version="1.0" encoding="utf-8"?>
-<p:sld xmlns:a="http://schemas.openxmlformats.org/drawingml/2006/main" xmlns:p="http://schemas.openxmlformats.org/presentationml/2006/main" xmlns:r="http://schemas.openxmlformats.org/officeDocument/2006/relationships">
-  <p:cSld>
-    <p:spTree>
-      <p:nvGrpSpPr>
-        <p:cNvPr id="1" name=""/>
-        <p:cNvGrpSpPr/>
-        <p:nvPr/>
-      </p:nvGrpSpPr>
-      <p:grpSpPr/>
-      <p:sp>
-        <p:nvSpPr>
-          <p:cNvPr id="2" name="TextBox 1"/>
-          <p:cNvSpPr txBox="1"/>
-          <p:nvPr/>
-        </p:nvSpPr>
-        <p:spPr>
-          <a:xfrm>
             <a:off x="457200" y="457200"/>
             <a:ext cx="8229600" cy="914400"/>
           </a:xfrm>
@@ -3911,7 +4905,7 @@
               </a:defRPr>
             </a:pPr>
             <a:r>
-              <a:t>Feasibility: Can We Run ROS in WASM?</a:t>
+              <a:t>Feasibility: Can We Run microROS in WASM?</a:t>
             </a:r>
           </a:p>
         </p:txBody>
@@ -4068,7 +5062,7 @@
               <a:defRPr sz="1600"/>
             </a:pPr>
             <a:r>
-              <a:t>✓ ROS in WASM: Feasible</a:t>
+              <a:t>✓ Core microROS: Compatible</a:t>
             </a:r>
           </a:p>
           <a:p>
@@ -4090,7 +5084,7 @@
               <a:defRPr sz="1600"/>
             </a:pPr>
             <a:r>
-              <a:t>✓ Direct WASM-to-WASM: Yes</a:t>
+              <a:t>✓ Pub/Sub: Demonstrated</a:t>
             </a:r>
           </a:p>
           <a:p>
@@ -4145,7 +5139,7 @@
               <a:defRPr sz="1500"/>
             </a:pPr>
             <a:r>
-              <a:t>• Implement ROS2 DDS in WASM</a:t>
+              <a:t>• Implement ROS2 DDS layer</a:t>
             </a:r>
           </a:p>
           <a:p>

</xml_diff>